<commit_message>
chore: add dataset uncompressed, as well as rs du initial script
</commit_message>
<xml_diff>
--- a/docs/data_understanding/recommender_system_du.pptx
+++ b/docs/data_understanding/recommender_system_du.pptx
@@ -7,6 +7,8 @@
   <p:sldIdLst>
     <p:sldId id="256" r:id="rId2"/>
     <p:sldId id="257" r:id="rId3"/>
+    <p:sldId id="260" r:id="rId4"/>
+    <p:sldId id="258" r:id="rId5"/>
   </p:sldIdLst>
   <p:sldSz cx="12192000" cy="6858000"/>
   <p:notesSz cx="6858000" cy="9144000"/>
@@ -105,6 +107,11 @@
       </a:defRPr>
     </a:lvl9pPr>
   </p:defaultTextStyle>
+  <p:extLst>
+    <p:ext uri="{EFAFB233-063F-42B5-8137-9DF3F51BA10A}">
+      <p15:sldGuideLst xmlns:p15="http://schemas.microsoft.com/office/powerpoint/2012/main"/>
+    </p:ext>
+  </p:extLst>
 </p:presentation>
 </file>
 
@@ -3327,9 +3334,17 @@
 <p:sldMaster xmlns:a="http://schemas.openxmlformats.org/drawingml/2006/main" xmlns:r="http://schemas.openxmlformats.org/officeDocument/2006/relationships" xmlns:p="http://schemas.openxmlformats.org/presentationml/2006/main">
   <p:cSld>
     <p:bg>
-      <p:bgRef idx="1001">
-        <a:schemeClr val="bg1"/>
-      </p:bgRef>
+      <p:bgPr>
+        <a:pattFill prst="pct5">
+          <a:fgClr>
+            <a:schemeClr val="accent1"/>
+          </a:fgClr>
+          <a:bgClr>
+            <a:schemeClr val="bg1"/>
+          </a:bgClr>
+        </a:pattFill>
+        <a:effectLst/>
+      </p:bgPr>
     </p:bg>
     <p:spTree>
       <p:nvGrpSpPr>
@@ -3896,14 +3911,6 @@
 <file path=ppt/slides/slide1.xml><?xml version="1.0" encoding="utf-8"?>
 <p:sld xmlns:a="http://schemas.openxmlformats.org/drawingml/2006/main" xmlns:r="http://schemas.openxmlformats.org/officeDocument/2006/relationships" xmlns:p="http://schemas.openxmlformats.org/presentationml/2006/main">
   <p:cSld>
-    <p:bg>
-      <p:bgPr>
-        <a:solidFill>
-          <a:schemeClr val="bg1"/>
-        </a:solidFill>
-        <a:effectLst/>
-      </p:bgPr>
-    </p:bg>
     <p:spTree>
       <p:nvGrpSpPr>
         <p:cNvPr id="1" name=""/>
@@ -4214,15 +4221,23 @@
           <a:lstStyle/>
           <a:p>
             <a:r>
-              <a:rPr lang="pt-PT" sz="2000">
+              <a:rPr lang="pt-PT" sz="2000" dirty="0" err="1">
                 <a:solidFill>
                   <a:srgbClr val="FFFFFF"/>
                 </a:solidFill>
               </a:rPr>
-              <a:t>Using </a:t>
-            </a:r>
-            <a:r>
-              <a:rPr lang="pt-PT" sz="2000" i="1">
+              <a:t>Using</a:t>
+            </a:r>
+            <a:r>
+              <a:rPr lang="pt-PT" sz="2000" dirty="0">
+                <a:solidFill>
+                  <a:srgbClr val="FFFFFF"/>
+                </a:solidFill>
+              </a:rPr>
+              <a:t> </a:t>
+            </a:r>
+            <a:r>
+              <a:rPr lang="pt-PT" sz="2000" i="1" dirty="0" err="1">
                 <a:solidFill>
                   <a:srgbClr val="FFFFFF"/>
                 </a:solidFill>
@@ -4230,13 +4245,74 @@
               <a:t>Yelp</a:t>
             </a:r>
             <a:r>
-              <a:rPr lang="pt-PT" sz="2000">
+              <a:rPr lang="pt-PT" sz="2000" dirty="0">
                 <a:solidFill>
                   <a:srgbClr val="FFFFFF"/>
                 </a:solidFill>
               </a:rPr>
-              <a:t> dataset to create a Recomender System</a:t>
-            </a:r>
+              <a:t> </a:t>
+            </a:r>
+            <a:r>
+              <a:rPr lang="pt-PT" sz="2000" dirty="0" err="1">
+                <a:solidFill>
+                  <a:srgbClr val="FFFFFF"/>
+                </a:solidFill>
+              </a:rPr>
+              <a:t>dataset</a:t>
+            </a:r>
+            <a:r>
+              <a:rPr lang="pt-PT" sz="2000" dirty="0">
+                <a:solidFill>
+                  <a:srgbClr val="FFFFFF"/>
+                </a:solidFill>
+              </a:rPr>
+              <a:t> to </a:t>
+            </a:r>
+            <a:r>
+              <a:rPr lang="pt-PT" sz="2000" dirty="0" err="1">
+                <a:solidFill>
+                  <a:srgbClr val="FFFFFF"/>
+                </a:solidFill>
+              </a:rPr>
+              <a:t>create</a:t>
+            </a:r>
+            <a:r>
+              <a:rPr lang="pt-PT" sz="2000" dirty="0">
+                <a:solidFill>
+                  <a:srgbClr val="FFFFFF"/>
+                </a:solidFill>
+              </a:rPr>
+              <a:t> a </a:t>
+            </a:r>
+            <a:r>
+              <a:rPr lang="pt-PT" sz="2000" dirty="0" err="1">
+                <a:solidFill>
+                  <a:srgbClr val="FFFFFF"/>
+                </a:solidFill>
+              </a:rPr>
+              <a:t>Recomender</a:t>
+            </a:r>
+            <a:r>
+              <a:rPr lang="pt-PT" sz="2000" dirty="0">
+                <a:solidFill>
+                  <a:srgbClr val="FFFFFF"/>
+                </a:solidFill>
+              </a:rPr>
+              <a:t> </a:t>
+            </a:r>
+            <a:r>
+              <a:rPr lang="pt-PT" sz="2000" dirty="0" err="1">
+                <a:solidFill>
+                  <a:srgbClr val="FFFFFF"/>
+                </a:solidFill>
+              </a:rPr>
+              <a:t>System</a:t>
+            </a:r>
+            <a:endParaRPr lang="pt-PT" sz="2000" dirty="0">
+              <a:solidFill>
+                <a:srgbClr val="FFFFFF"/>
+              </a:solidFill>
+            </a:endParaRPr>
           </a:p>
         </p:txBody>
       </p:sp>
@@ -4856,6 +4932,36 @@
           </a:p>
         </p:txBody>
       </p:sp>
+      <p:pic>
+        <p:nvPicPr>
+          <p:cNvPr id="5" name="Imagem 4">
+            <a:extLst>
+              <a:ext uri="{FF2B5EF4-FFF2-40B4-BE49-F238E27FC236}">
+                <a16:creationId xmlns:a16="http://schemas.microsoft.com/office/drawing/2014/main" id="{E5AEEC28-794D-9F04-7267-69FF0A3E42CC}"/>
+              </a:ext>
+            </a:extLst>
+          </p:cNvPr>
+          <p:cNvPicPr>
+            <a:picLocks noChangeAspect="1"/>
+          </p:cNvPicPr>
+          <p:nvPr/>
+        </p:nvPicPr>
+        <p:blipFill>
+          <a:blip r:embed="rId3"/>
+          <a:stretch>
+            <a:fillRect/>
+          </a:stretch>
+        </p:blipFill>
+        <p:spPr>
+          <a:xfrm>
+            <a:off x="9599603" y="488728"/>
+            <a:ext cx="1927059" cy="635483"/>
+          </a:xfrm>
+          <a:prstGeom prst="rect">
+            <a:avLst/>
+          </a:prstGeom>
+        </p:spPr>
+      </p:pic>
     </p:spTree>
     <p:extLst>
       <p:ext uri="{BB962C8B-B14F-4D97-AF65-F5344CB8AC3E}">
@@ -4872,14 +4978,6 @@
 <file path=ppt/slides/slide2.xml><?xml version="1.0" encoding="utf-8"?>
 <p:sld xmlns:a="http://schemas.openxmlformats.org/drawingml/2006/main" xmlns:r="http://schemas.openxmlformats.org/officeDocument/2006/relationships" xmlns:p="http://schemas.openxmlformats.org/presentationml/2006/main">
   <p:cSld>
-    <p:bg>
-      <p:bgPr>
-        <a:solidFill>
-          <a:schemeClr val="bg1"/>
-        </a:solidFill>
-        <a:effectLst/>
-      </p:bgPr>
-    </p:bg>
     <p:spTree>
       <p:nvGrpSpPr>
         <p:cNvPr id="1" name=""/>
@@ -5046,7 +5144,7 @@
         </p:nvSpPr>
         <p:spPr>
           <a:xfrm>
-            <a:off x="1522030" y="1209220"/>
+            <a:off x="1522030" y="1074819"/>
             <a:ext cx="9147940" cy="2337238"/>
           </a:xfrm>
         </p:spPr>
@@ -5058,7 +5156,7 @@
           <a:p>
             <a:pPr algn="ctr"/>
             <a:r>
-              <a:rPr lang="en-US" sz="6000" b="1" i="0" kern="1200" cap="all" baseline="0">
+              <a:rPr lang="en-US" sz="6000" b="1" i="0" kern="1200" cap="all" baseline="0" dirty="0">
                 <a:solidFill>
                   <a:schemeClr val="bg1"/>
                 </a:solidFill>
@@ -5066,7 +5164,28 @@
                 <a:ea typeface="+mj-ea"/>
                 <a:cs typeface="+mj-cs"/>
               </a:rPr>
-              <a:t>Dataset Description</a:t>
+              <a:t>Dataset </a:t>
+            </a:r>
+            <a:br>
+              <a:rPr lang="en-US" sz="6000" b="1" i="0" kern="1200" cap="all" baseline="0" dirty="0">
+                <a:solidFill>
+                  <a:schemeClr val="bg1"/>
+                </a:solidFill>
+                <a:latin typeface="+mj-lt"/>
+                <a:ea typeface="+mj-ea"/>
+                <a:cs typeface="+mj-cs"/>
+              </a:rPr>
+            </a:br>
+            <a:r>
+              <a:rPr lang="en-US" sz="6000" b="1" i="0" kern="1200" cap="all" baseline="0" dirty="0">
+                <a:solidFill>
+                  <a:schemeClr val="bg1"/>
+                </a:solidFill>
+                <a:latin typeface="+mj-lt"/>
+                <a:ea typeface="+mj-ea"/>
+                <a:cs typeface="+mj-cs"/>
+              </a:rPr>
+              <a:t>Dimension</a:t>
             </a:r>
           </a:p>
         </p:txBody>
@@ -6070,10 +6189,3145 @@
           </a:fontRef>
         </p:style>
       </p:cxnSp>
+      <p:grpSp>
+        <p:nvGrpSpPr>
+          <p:cNvPr id="33" name="Agrupar 32">
+            <a:extLst>
+              <a:ext uri="{FF2B5EF4-FFF2-40B4-BE49-F238E27FC236}">
+                <a16:creationId xmlns:a16="http://schemas.microsoft.com/office/drawing/2014/main" id="{71C0403F-DB4E-4979-7A01-5229BC1E6FFF}"/>
+              </a:ext>
+            </a:extLst>
+          </p:cNvPr>
+          <p:cNvGrpSpPr/>
+          <p:nvPr/>
+        </p:nvGrpSpPr>
+        <p:grpSpPr>
+          <a:xfrm>
+            <a:off x="1339664" y="3603012"/>
+            <a:ext cx="9512672" cy="1631150"/>
+            <a:chOff x="1359361" y="3603012"/>
+            <a:chExt cx="9512672" cy="1631150"/>
+          </a:xfrm>
+        </p:grpSpPr>
+        <p:grpSp>
+          <p:nvGrpSpPr>
+            <p:cNvPr id="20" name="Agrupar 19">
+              <a:extLst>
+                <a:ext uri="{FF2B5EF4-FFF2-40B4-BE49-F238E27FC236}">
+                  <a16:creationId xmlns:a16="http://schemas.microsoft.com/office/drawing/2014/main" id="{29663594-600D-CFA6-7FFC-4781F7DC4B51}"/>
+                </a:ext>
+              </a:extLst>
+            </p:cNvPr>
+            <p:cNvGrpSpPr/>
+            <p:nvPr/>
+          </p:nvGrpSpPr>
+          <p:grpSpPr>
+            <a:xfrm>
+              <a:off x="1697609" y="3603012"/>
+              <a:ext cx="8831604" cy="980049"/>
+              <a:chOff x="1838366" y="4134227"/>
+              <a:chExt cx="8831604" cy="980049"/>
+            </a:xfrm>
+          </p:grpSpPr>
+          <p:pic>
+            <p:nvPicPr>
+              <p:cNvPr id="4" name="Gráfico 3" descr="Banco destaque">
+                <a:extLst>
+                  <a:ext uri="{FF2B5EF4-FFF2-40B4-BE49-F238E27FC236}">
+                    <a16:creationId xmlns:a16="http://schemas.microsoft.com/office/drawing/2014/main" id="{80885C0E-0081-29BA-DA9C-45547EDBBF55}"/>
+                  </a:ext>
+                </a:extLst>
+              </p:cNvPr>
+              <p:cNvPicPr>
+                <a:picLocks noChangeAspect="1"/>
+              </p:cNvPicPr>
+              <p:nvPr/>
+            </p:nvPicPr>
+            <p:blipFill>
+              <a:blip r:embed="rId2">
+                <a:extLst>
+                  <a:ext uri="{28A0092B-C50C-407E-A947-70E740481C1C}">
+                    <a14:useLocalDpi xmlns:a14="http://schemas.microsoft.com/office/drawing/2010/main" val="0"/>
+                  </a:ext>
+                  <a:ext uri="{96DAC541-7B7A-43D3-8B79-37D633B846F1}">
+                    <asvg:svgBlip xmlns:asvg="http://schemas.microsoft.com/office/drawing/2016/SVG/main" r:embed="rId3"/>
+                  </a:ext>
+                </a:extLst>
+              </a:blip>
+              <a:stretch>
+                <a:fillRect/>
+              </a:stretch>
+            </p:blipFill>
+            <p:spPr>
+              <a:xfrm>
+                <a:off x="1838366" y="4134227"/>
+                <a:ext cx="914400" cy="914400"/>
+              </a:xfrm>
+              <a:prstGeom prst="rect">
+                <a:avLst/>
+              </a:prstGeom>
+            </p:spPr>
+          </p:pic>
+          <p:pic>
+            <p:nvPicPr>
+              <p:cNvPr id="6" name="Gráfico 5" descr="Prancheta com preenchimento sólido">
+                <a:extLst>
+                  <a:ext uri="{FF2B5EF4-FFF2-40B4-BE49-F238E27FC236}">
+                    <a16:creationId xmlns:a16="http://schemas.microsoft.com/office/drawing/2014/main" id="{16613395-1587-6309-9B1B-7E621688C436}"/>
+                  </a:ext>
+                </a:extLst>
+              </p:cNvPr>
+              <p:cNvPicPr>
+                <a:picLocks noChangeAspect="1"/>
+              </p:cNvPicPr>
+              <p:nvPr/>
+            </p:nvPicPr>
+            <p:blipFill>
+              <a:blip r:embed="rId4">
+                <a:extLst>
+                  <a:ext uri="{28A0092B-C50C-407E-A947-70E740481C1C}">
+                    <a14:useLocalDpi xmlns:a14="http://schemas.microsoft.com/office/drawing/2010/main" val="0"/>
+                  </a:ext>
+                  <a:ext uri="{96DAC541-7B7A-43D3-8B79-37D633B846F1}">
+                    <asvg:svgBlip xmlns:asvg="http://schemas.microsoft.com/office/drawing/2016/SVG/main" r:embed="rId5"/>
+                  </a:ext>
+                </a:extLst>
+              </a:blip>
+              <a:stretch>
+                <a:fillRect/>
+              </a:stretch>
+            </p:blipFill>
+            <p:spPr>
+              <a:xfrm>
+                <a:off x="3817667" y="4134227"/>
+                <a:ext cx="914400" cy="914400"/>
+              </a:xfrm>
+              <a:prstGeom prst="rect">
+                <a:avLst/>
+              </a:prstGeom>
+            </p:spPr>
+          </p:pic>
+          <p:pic>
+            <p:nvPicPr>
+              <p:cNvPr id="10" name="Gráfico 9" descr="Utilizador com preenchimento sólido">
+                <a:extLst>
+                  <a:ext uri="{FF2B5EF4-FFF2-40B4-BE49-F238E27FC236}">
+                    <a16:creationId xmlns:a16="http://schemas.microsoft.com/office/drawing/2014/main" id="{9AC6F8EC-8513-9356-AEBD-888659DCEEFB}"/>
+                  </a:ext>
+                </a:extLst>
+              </p:cNvPr>
+              <p:cNvPicPr>
+                <a:picLocks noChangeAspect="1"/>
+              </p:cNvPicPr>
+              <p:nvPr/>
+            </p:nvPicPr>
+            <p:blipFill>
+              <a:blip r:embed="rId6">
+                <a:extLst>
+                  <a:ext uri="{28A0092B-C50C-407E-A947-70E740481C1C}">
+                    <a14:useLocalDpi xmlns:a14="http://schemas.microsoft.com/office/drawing/2010/main" val="0"/>
+                  </a:ext>
+                  <a:ext uri="{96DAC541-7B7A-43D3-8B79-37D633B846F1}">
+                    <asvg:svgBlip xmlns:asvg="http://schemas.microsoft.com/office/drawing/2016/SVG/main" r:embed="rId7"/>
+                  </a:ext>
+                </a:extLst>
+              </a:blip>
+              <a:srcRect/>
+              <a:stretch/>
+            </p:blipFill>
+            <p:spPr>
+              <a:xfrm>
+                <a:off x="7776269" y="4134227"/>
+                <a:ext cx="914400" cy="914400"/>
+              </a:xfrm>
+              <a:prstGeom prst="rect">
+                <a:avLst/>
+              </a:prstGeom>
+            </p:spPr>
+          </p:pic>
+          <p:pic>
+            <p:nvPicPr>
+              <p:cNvPr id="14" name="Gráfico 13" descr="Divisas com preenchimento sólido">
+                <a:extLst>
+                  <a:ext uri="{FF2B5EF4-FFF2-40B4-BE49-F238E27FC236}">
+                    <a16:creationId xmlns:a16="http://schemas.microsoft.com/office/drawing/2014/main" id="{AD402AA8-DEB1-4852-CC4B-96CA41320AB7}"/>
+                  </a:ext>
+                </a:extLst>
+              </p:cNvPr>
+              <p:cNvPicPr>
+                <a:picLocks noChangeAspect="1"/>
+              </p:cNvPicPr>
+              <p:nvPr/>
+            </p:nvPicPr>
+            <p:blipFill>
+              <a:blip r:embed="rId8">
+                <a:extLst>
+                  <a:ext uri="{28A0092B-C50C-407E-A947-70E740481C1C}">
+                    <a14:useLocalDpi xmlns:a14="http://schemas.microsoft.com/office/drawing/2010/main" val="0"/>
+                  </a:ext>
+                  <a:ext uri="{96DAC541-7B7A-43D3-8B79-37D633B846F1}">
+                    <asvg:svgBlip xmlns:asvg="http://schemas.microsoft.com/office/drawing/2016/SVG/main" r:embed="rId9"/>
+                  </a:ext>
+                </a:extLst>
+              </a:blip>
+              <a:stretch>
+                <a:fillRect/>
+              </a:stretch>
+            </p:blipFill>
+            <p:spPr>
+              <a:xfrm>
+                <a:off x="9755570" y="4134227"/>
+                <a:ext cx="914400" cy="914400"/>
+              </a:xfrm>
+              <a:prstGeom prst="rect">
+                <a:avLst/>
+              </a:prstGeom>
+            </p:spPr>
+          </p:pic>
+          <p:pic>
+            <p:nvPicPr>
+              <p:cNvPr id="18" name="Gráfico 17" descr="Comentário: gostar com preenchimento sólido">
+                <a:extLst>
+                  <a:ext uri="{FF2B5EF4-FFF2-40B4-BE49-F238E27FC236}">
+                    <a16:creationId xmlns:a16="http://schemas.microsoft.com/office/drawing/2014/main" id="{09EA09E9-B9A4-FC5C-F60E-AE3F89C09CE0}"/>
+                  </a:ext>
+                </a:extLst>
+              </p:cNvPr>
+              <p:cNvPicPr>
+                <a:picLocks noChangeAspect="1"/>
+              </p:cNvPicPr>
+              <p:nvPr/>
+            </p:nvPicPr>
+            <p:blipFill>
+              <a:blip r:embed="rId10">
+                <a:extLst>
+                  <a:ext uri="{28A0092B-C50C-407E-A947-70E740481C1C}">
+                    <a14:useLocalDpi xmlns:a14="http://schemas.microsoft.com/office/drawing/2010/main" val="0"/>
+                  </a:ext>
+                  <a:ext uri="{96DAC541-7B7A-43D3-8B79-37D633B846F1}">
+                    <asvg:svgBlip xmlns:asvg="http://schemas.microsoft.com/office/drawing/2016/SVG/main" r:embed="rId11"/>
+                  </a:ext>
+                </a:extLst>
+              </a:blip>
+              <a:stretch>
+                <a:fillRect/>
+              </a:stretch>
+            </p:blipFill>
+            <p:spPr>
+              <a:xfrm>
+                <a:off x="5796968" y="4199876"/>
+                <a:ext cx="914400" cy="914400"/>
+              </a:xfrm>
+              <a:prstGeom prst="rect">
+                <a:avLst/>
+              </a:prstGeom>
+            </p:spPr>
+          </p:pic>
+        </p:grpSp>
+        <p:sp>
+          <p:nvSpPr>
+            <p:cNvPr id="22" name="CaixaDeTexto 21">
+              <a:extLst>
+                <a:ext uri="{FF2B5EF4-FFF2-40B4-BE49-F238E27FC236}">
+                  <a16:creationId xmlns:a16="http://schemas.microsoft.com/office/drawing/2014/main" id="{6F3A2ED8-7C68-5F56-5316-0CE7A7A8AB10}"/>
+                </a:ext>
+              </a:extLst>
+            </p:cNvPr>
+            <p:cNvSpPr txBox="1"/>
+            <p:nvPr/>
+          </p:nvSpPr>
+          <p:spPr>
+            <a:xfrm>
+              <a:off x="1359361" y="4583061"/>
+              <a:ext cx="1593944" cy="646331"/>
+            </a:xfrm>
+            <a:prstGeom prst="rect">
+              <a:avLst/>
+            </a:prstGeom>
+            <a:noFill/>
+          </p:spPr>
+          <p:txBody>
+            <a:bodyPr wrap="square" rtlCol="0">
+              <a:spAutoFit/>
+            </a:bodyPr>
+            <a:lstStyle/>
+            <a:p>
+              <a:pPr algn="ctr"/>
+              <a:r>
+                <a:rPr lang="pt-PT" b="1" dirty="0">
+                  <a:solidFill>
+                    <a:schemeClr val="bg1"/>
+                  </a:solidFill>
+                </a:rPr>
+                <a:t>150 346 </a:t>
+              </a:r>
+              <a:r>
+                <a:rPr lang="pt-PT" dirty="0">
+                  <a:solidFill>
+                    <a:schemeClr val="bg1"/>
+                  </a:solidFill>
+                </a:rPr>
+                <a:t>businesses</a:t>
+              </a:r>
+            </a:p>
+          </p:txBody>
+        </p:sp>
+        <p:sp>
+          <p:nvSpPr>
+            <p:cNvPr id="26" name="CaixaDeTexto 25">
+              <a:extLst>
+                <a:ext uri="{FF2B5EF4-FFF2-40B4-BE49-F238E27FC236}">
+                  <a16:creationId xmlns:a16="http://schemas.microsoft.com/office/drawing/2014/main" id="{F99B0029-B0DA-5261-58A9-ABD148BCE3AE}"/>
+                </a:ext>
+              </a:extLst>
+            </p:cNvPr>
+            <p:cNvSpPr txBox="1"/>
+            <p:nvPr/>
+          </p:nvSpPr>
+          <p:spPr>
+            <a:xfrm>
+              <a:off x="3168778" y="4583061"/>
+              <a:ext cx="1930663" cy="646331"/>
+            </a:xfrm>
+            <a:prstGeom prst="rect">
+              <a:avLst/>
+            </a:prstGeom>
+            <a:noFill/>
+          </p:spPr>
+          <p:txBody>
+            <a:bodyPr wrap="square" rtlCol="0">
+              <a:spAutoFit/>
+            </a:bodyPr>
+            <a:lstStyle/>
+            <a:p>
+              <a:pPr algn="ctr"/>
+              <a:r>
+                <a:rPr lang="pt-PT" b="1" dirty="0">
+                  <a:solidFill>
+                    <a:schemeClr val="bg1"/>
+                  </a:solidFill>
+                </a:rPr>
+                <a:t>6 990 280</a:t>
+              </a:r>
+            </a:p>
+            <a:p>
+              <a:pPr algn="ctr"/>
+              <a:r>
+                <a:rPr lang="pt-PT" dirty="0">
+                  <a:solidFill>
+                    <a:schemeClr val="bg1"/>
+                  </a:solidFill>
+                </a:rPr>
+                <a:t>reviews</a:t>
+              </a:r>
+            </a:p>
+          </p:txBody>
+        </p:sp>
+        <p:sp>
+          <p:nvSpPr>
+            <p:cNvPr id="27" name="CaixaDeTexto 26">
+              <a:extLst>
+                <a:ext uri="{FF2B5EF4-FFF2-40B4-BE49-F238E27FC236}">
+                  <a16:creationId xmlns:a16="http://schemas.microsoft.com/office/drawing/2014/main" id="{FB253F06-310D-4653-88DE-B04158F378A0}"/>
+                </a:ext>
+              </a:extLst>
+            </p:cNvPr>
+            <p:cNvSpPr txBox="1"/>
+            <p:nvPr/>
+          </p:nvSpPr>
+          <p:spPr>
+            <a:xfrm>
+              <a:off x="5316439" y="4587831"/>
+              <a:ext cx="1593944" cy="646331"/>
+            </a:xfrm>
+            <a:prstGeom prst="rect">
+              <a:avLst/>
+            </a:prstGeom>
+            <a:noFill/>
+          </p:spPr>
+          <p:txBody>
+            <a:bodyPr wrap="square" rtlCol="0">
+              <a:spAutoFit/>
+            </a:bodyPr>
+            <a:lstStyle/>
+            <a:p>
+              <a:pPr algn="ctr"/>
+              <a:r>
+                <a:rPr lang="pt-PT" b="1" dirty="0">
+                  <a:solidFill>
+                    <a:schemeClr val="bg1"/>
+                  </a:solidFill>
+                </a:rPr>
+                <a:t>908 915</a:t>
+              </a:r>
+            </a:p>
+            <a:p>
+              <a:pPr algn="ctr"/>
+              <a:r>
+                <a:rPr lang="pt-PT" dirty="0">
+                  <a:solidFill>
+                    <a:schemeClr val="bg1"/>
+                  </a:solidFill>
+                </a:rPr>
+                <a:t>tips</a:t>
+              </a:r>
+            </a:p>
+          </p:txBody>
+        </p:sp>
+        <p:sp>
+          <p:nvSpPr>
+            <p:cNvPr id="28" name="CaixaDeTexto 27">
+              <a:extLst>
+                <a:ext uri="{FF2B5EF4-FFF2-40B4-BE49-F238E27FC236}">
+                  <a16:creationId xmlns:a16="http://schemas.microsoft.com/office/drawing/2014/main" id="{388961E7-1C85-08BE-1C81-D641E46C2B64}"/>
+                </a:ext>
+              </a:extLst>
+            </p:cNvPr>
+            <p:cNvSpPr txBox="1"/>
+            <p:nvPr/>
+          </p:nvSpPr>
+          <p:spPr>
+            <a:xfrm>
+              <a:off x="7297264" y="4583063"/>
+              <a:ext cx="1593944" cy="646331"/>
+            </a:xfrm>
+            <a:prstGeom prst="rect">
+              <a:avLst/>
+            </a:prstGeom>
+            <a:noFill/>
+          </p:spPr>
+          <p:txBody>
+            <a:bodyPr wrap="square" rtlCol="0">
+              <a:spAutoFit/>
+            </a:bodyPr>
+            <a:lstStyle/>
+            <a:p>
+              <a:pPr algn="ctr"/>
+              <a:r>
+                <a:rPr lang="pt-PT" b="1" dirty="0">
+                  <a:solidFill>
+                    <a:schemeClr val="bg1"/>
+                  </a:solidFill>
+                </a:rPr>
+                <a:t>1 987 897</a:t>
+              </a:r>
+            </a:p>
+            <a:p>
+              <a:pPr algn="ctr"/>
+              <a:r>
+                <a:rPr lang="pt-PT" dirty="0">
+                  <a:solidFill>
+                    <a:schemeClr val="bg1"/>
+                  </a:solidFill>
+                </a:rPr>
+                <a:t>users</a:t>
+              </a:r>
+            </a:p>
+          </p:txBody>
+        </p:sp>
+        <p:sp>
+          <p:nvSpPr>
+            <p:cNvPr id="29" name="CaixaDeTexto 28">
+              <a:extLst>
+                <a:ext uri="{FF2B5EF4-FFF2-40B4-BE49-F238E27FC236}">
+                  <a16:creationId xmlns:a16="http://schemas.microsoft.com/office/drawing/2014/main" id="{3DDE009E-E9B5-7396-B38C-E738E84E44AC}"/>
+                </a:ext>
+              </a:extLst>
+            </p:cNvPr>
+            <p:cNvSpPr txBox="1"/>
+            <p:nvPr/>
+          </p:nvSpPr>
+          <p:spPr>
+            <a:xfrm>
+              <a:off x="9278089" y="4587830"/>
+              <a:ext cx="1593944" cy="646331"/>
+            </a:xfrm>
+            <a:prstGeom prst="rect">
+              <a:avLst/>
+            </a:prstGeom>
+            <a:noFill/>
+          </p:spPr>
+          <p:txBody>
+            <a:bodyPr wrap="square" rtlCol="0">
+              <a:spAutoFit/>
+            </a:bodyPr>
+            <a:lstStyle/>
+            <a:p>
+              <a:pPr algn="ctr"/>
+              <a:r>
+                <a:rPr lang="pt-PT" b="1" dirty="0">
+                  <a:solidFill>
+                    <a:schemeClr val="bg1"/>
+                  </a:solidFill>
+                </a:rPr>
+                <a:t>131 930</a:t>
+              </a:r>
+            </a:p>
+            <a:p>
+              <a:pPr algn="ctr"/>
+              <a:r>
+                <a:rPr lang="pt-PT" dirty="0" err="1">
+                  <a:solidFill>
+                    <a:schemeClr val="bg1"/>
+                  </a:solidFill>
+                </a:rPr>
+                <a:t>check-in’s</a:t>
+              </a:r>
+              <a:endParaRPr lang="pt-PT" dirty="0">
+                <a:solidFill>
+                  <a:schemeClr val="bg1"/>
+                </a:solidFill>
+              </a:endParaRPr>
+            </a:p>
+          </p:txBody>
+        </p:sp>
+      </p:grpSp>
+      <p:sp>
+        <p:nvSpPr>
+          <p:cNvPr id="32" name="CaixaDeTexto 31">
+            <a:extLst>
+              <a:ext uri="{FF2B5EF4-FFF2-40B4-BE49-F238E27FC236}">
+                <a16:creationId xmlns:a16="http://schemas.microsoft.com/office/drawing/2014/main" id="{946E2C4F-D217-FE9C-8FFB-9683C35532F2}"/>
+              </a:ext>
+            </a:extLst>
+          </p:cNvPr>
+          <p:cNvSpPr txBox="1"/>
+          <p:nvPr/>
+        </p:nvSpPr>
+        <p:spPr>
+          <a:xfrm>
+            <a:off x="3364899" y="5444538"/>
+            <a:ext cx="5462203" cy="754053"/>
+          </a:xfrm>
+          <a:prstGeom prst="rect">
+            <a:avLst/>
+          </a:prstGeom>
+          <a:noFill/>
+        </p:spPr>
+        <p:txBody>
+          <a:bodyPr wrap="square" rtlCol="0">
+            <a:spAutoFit/>
+          </a:bodyPr>
+          <a:lstStyle/>
+          <a:p>
+            <a:pPr algn="ctr"/>
+            <a:r>
+              <a:rPr lang="pt-PT" b="1" dirty="0" err="1">
+                <a:solidFill>
+                  <a:schemeClr val="bg1"/>
+                </a:solidFill>
+              </a:rPr>
+              <a:t>Loading</a:t>
+            </a:r>
+            <a:r>
+              <a:rPr lang="pt-PT" b="1" dirty="0">
+                <a:solidFill>
+                  <a:schemeClr val="bg1"/>
+                </a:solidFill>
+              </a:rPr>
+              <a:t> time </a:t>
+            </a:r>
+          </a:p>
+          <a:p>
+            <a:pPr algn="ctr"/>
+            <a:endParaRPr lang="pt-PT" sz="600" b="1" dirty="0">
+              <a:solidFill>
+                <a:schemeClr val="bg1"/>
+              </a:solidFill>
+            </a:endParaRPr>
+          </a:p>
+          <a:p>
+            <a:pPr algn="ctr"/>
+            <a:r>
+              <a:rPr lang="pt-PT" sz="1200" i="1" dirty="0">
+                <a:solidFill>
+                  <a:schemeClr val="bg1"/>
+                </a:solidFill>
+              </a:rPr>
+              <a:t>(with </a:t>
+            </a:r>
+            <a:r>
+              <a:rPr lang="pt-PT" sz="1200" i="1" dirty="0" err="1">
+                <a:solidFill>
+                  <a:schemeClr val="bg1"/>
+                </a:solidFill>
+              </a:rPr>
+              <a:t>Python</a:t>
+            </a:r>
+            <a:r>
+              <a:rPr lang="pt-PT" sz="1200" i="1" dirty="0">
+                <a:solidFill>
+                  <a:schemeClr val="bg1"/>
+                </a:solidFill>
+              </a:rPr>
+              <a:t> 3.10.8, Intel Core i7 , 8th </a:t>
+            </a:r>
+            <a:r>
+              <a:rPr lang="pt-PT" sz="1200" i="1" dirty="0" err="1">
+                <a:solidFill>
+                  <a:schemeClr val="bg1"/>
+                </a:solidFill>
+              </a:rPr>
+              <a:t>Gen</a:t>
+            </a:r>
+            <a:r>
+              <a:rPr lang="pt-PT" sz="1200" i="1" dirty="0">
+                <a:solidFill>
+                  <a:schemeClr val="bg1"/>
+                </a:solidFill>
+              </a:rPr>
+              <a:t> </a:t>
+            </a:r>
+            <a:r>
+              <a:rPr lang="pt-PT" sz="1200" i="1" dirty="0" err="1">
+                <a:solidFill>
+                  <a:schemeClr val="bg1"/>
+                </a:solidFill>
+              </a:rPr>
+              <a:t>and</a:t>
+            </a:r>
+            <a:r>
+              <a:rPr lang="pt-PT" sz="1200" i="1" dirty="0">
+                <a:solidFill>
+                  <a:schemeClr val="bg1"/>
+                </a:solidFill>
+              </a:rPr>
+              <a:t> 16Gb </a:t>
+            </a:r>
+            <a:r>
+              <a:rPr lang="pt-PT" sz="1200" i="1" dirty="0" err="1">
+                <a:solidFill>
+                  <a:schemeClr val="bg1"/>
+                </a:solidFill>
+              </a:rPr>
+              <a:t>of</a:t>
+            </a:r>
+            <a:r>
+              <a:rPr lang="pt-PT" sz="1200" i="1" dirty="0">
+                <a:solidFill>
+                  <a:schemeClr val="bg1"/>
+                </a:solidFill>
+              </a:rPr>
+              <a:t> RAM)</a:t>
+            </a:r>
+            <a:r>
+              <a:rPr lang="pt-PT" b="1" dirty="0">
+                <a:solidFill>
+                  <a:schemeClr val="bg1"/>
+                </a:solidFill>
+              </a:rPr>
+              <a:t> </a:t>
+            </a:r>
+            <a:endParaRPr lang="pt-PT" dirty="0">
+              <a:solidFill>
+                <a:schemeClr val="bg1"/>
+              </a:solidFill>
+            </a:endParaRPr>
+          </a:p>
+        </p:txBody>
+      </p:sp>
+      <p:sp>
+        <p:nvSpPr>
+          <p:cNvPr id="34" name="CaixaDeTexto 33">
+            <a:extLst>
+              <a:ext uri="{FF2B5EF4-FFF2-40B4-BE49-F238E27FC236}">
+                <a16:creationId xmlns:a16="http://schemas.microsoft.com/office/drawing/2014/main" id="{7382B957-1464-2BFF-AFA2-C7EC540D787C}"/>
+              </a:ext>
+            </a:extLst>
+          </p:cNvPr>
+          <p:cNvSpPr txBox="1"/>
+          <p:nvPr/>
+        </p:nvSpPr>
+        <p:spPr>
+          <a:xfrm>
+            <a:off x="5296742" y="6203525"/>
+            <a:ext cx="1593944" cy="369332"/>
+          </a:xfrm>
+          <a:prstGeom prst="rect">
+            <a:avLst/>
+          </a:prstGeom>
+          <a:noFill/>
+        </p:spPr>
+        <p:txBody>
+          <a:bodyPr wrap="square" rtlCol="0">
+            <a:spAutoFit/>
+          </a:bodyPr>
+          <a:lstStyle/>
+          <a:p>
+            <a:pPr algn="ctr"/>
+            <a:r>
+              <a:rPr lang="pt-PT" b="1" dirty="0">
+                <a:solidFill>
+                  <a:schemeClr val="bg1"/>
+                </a:solidFill>
+              </a:rPr>
+              <a:t>15.2 minutes</a:t>
+            </a:r>
+          </a:p>
+        </p:txBody>
+      </p:sp>
     </p:spTree>
     <p:extLst>
       <p:ext uri="{BB962C8B-B14F-4D97-AF65-F5344CB8AC3E}">
         <p14:creationId xmlns:p14="http://schemas.microsoft.com/office/powerpoint/2010/main" val="1481249318"/>
+      </p:ext>
+    </p:extLst>
+  </p:cSld>
+  <p:clrMapOvr>
+    <a:masterClrMapping/>
+  </p:clrMapOvr>
+</p:sld>
+</file>
+
+<file path=ppt/slides/slide3.xml><?xml version="1.0" encoding="utf-8"?>
+<p:sld xmlns:a="http://schemas.openxmlformats.org/drawingml/2006/main" xmlns:r="http://schemas.openxmlformats.org/officeDocument/2006/relationships" xmlns:p="http://schemas.openxmlformats.org/presentationml/2006/main">
+  <p:cSld>
+    <p:bg>
+      <p:bgPr>
+        <a:solidFill>
+          <a:schemeClr val="bg1"/>
+        </a:solidFill>
+        <a:effectLst/>
+      </p:bgPr>
+    </p:bg>
+    <p:spTree>
+      <p:nvGrpSpPr>
+        <p:cNvPr id="1" name=""/>
+        <p:cNvGrpSpPr/>
+        <p:nvPr/>
+      </p:nvGrpSpPr>
+      <p:grpSpPr>
+        <a:xfrm>
+          <a:off x="0" y="0"/>
+          <a:ext cx="0" cy="0"/>
+          <a:chOff x="0" y="0"/>
+          <a:chExt cx="0" cy="0"/>
+        </a:xfrm>
+      </p:grpSpPr>
+      <p:sp useBgFill="1">
+        <p:nvSpPr>
+          <p:cNvPr id="53" name="Rectangle 52">
+            <a:extLst>
+              <a:ext uri="{FF2B5EF4-FFF2-40B4-BE49-F238E27FC236}">
+                <a16:creationId xmlns:a16="http://schemas.microsoft.com/office/drawing/2014/main" id="{327D73B4-9F5C-4A64-A179-51B9500CB8B5}"/>
+              </a:ext>
+              <a:ext uri="{C183D7F6-B498-43B3-948B-1728B52AA6E4}">
+                <adec:decorative xmlns:adec="http://schemas.microsoft.com/office/drawing/2017/decorative" val="1"/>
+              </a:ext>
+            </a:extLst>
+          </p:cNvPr>
+          <p:cNvSpPr>
+            <a:spLocks noGrp="1" noRot="1" noChangeAspect="1" noMove="1" noResize="1" noEditPoints="1" noAdjustHandles="1" noChangeArrowheads="1" noChangeShapeType="1" noTextEdit="1"/>
+          </p:cNvSpPr>
+          <p:nvPr>
+            <p:extLst>
+              <p:ext uri="{386F3935-93C4-4BCD-93E2-E3B085C9AB24}">
+                <p16:designElem xmlns:p16="http://schemas.microsoft.com/office/powerpoint/2015/main" val="1"/>
+              </p:ext>
+            </p:extLst>
+          </p:nvPr>
+        </p:nvSpPr>
+        <p:spPr>
+          <a:xfrm>
+            <a:off x="0" y="0"/>
+            <a:ext cx="12192000" cy="6858000"/>
+          </a:xfrm>
+          <a:prstGeom prst="rect">
+            <a:avLst/>
+          </a:prstGeom>
+          <a:ln>
+            <a:noFill/>
+          </a:ln>
+        </p:spPr>
+        <p:style>
+          <a:lnRef idx="2">
+            <a:schemeClr val="accent1">
+              <a:shade val="50000"/>
+            </a:schemeClr>
+          </a:lnRef>
+          <a:fillRef idx="1">
+            <a:schemeClr val="accent1"/>
+          </a:fillRef>
+          <a:effectRef idx="0">
+            <a:schemeClr val="accent1"/>
+          </a:effectRef>
+          <a:fontRef idx="minor">
+            <a:schemeClr val="lt1"/>
+          </a:fontRef>
+        </p:style>
+        <p:txBody>
+          <a:bodyPr rtlCol="0" anchor="ctr"/>
+          <a:lstStyle/>
+          <a:p>
+            <a:pPr algn="ctr"/>
+            <a:endParaRPr lang="en-US" dirty="0"/>
+          </a:p>
+        </p:txBody>
+      </p:sp>
+      <p:sp>
+        <p:nvSpPr>
+          <p:cNvPr id="12" name="Título 11">
+            <a:extLst>
+              <a:ext uri="{FF2B5EF4-FFF2-40B4-BE49-F238E27FC236}">
+                <a16:creationId xmlns:a16="http://schemas.microsoft.com/office/drawing/2014/main" id="{8E377F1F-02A1-98B6-DB3E-54B40C793A43}"/>
+              </a:ext>
+            </a:extLst>
+          </p:cNvPr>
+          <p:cNvSpPr>
+            <a:spLocks noGrp="1"/>
+          </p:cNvSpPr>
+          <p:nvPr>
+            <p:ph type="title"/>
+          </p:nvPr>
+        </p:nvSpPr>
+        <p:spPr>
+          <a:xfrm>
+            <a:off x="6657716" y="1052051"/>
+            <a:ext cx="4529328" cy="1467741"/>
+          </a:xfrm>
+        </p:spPr>
+        <p:txBody>
+          <a:bodyPr vert="horz" lIns="91440" tIns="45720" rIns="91440" bIns="45720" rtlCol="0" anchor="b">
+            <a:normAutofit/>
+          </a:bodyPr>
+          <a:lstStyle/>
+          <a:p>
+            <a:r>
+              <a:rPr lang="en-US" b="1" kern="1200" dirty="0">
+                <a:latin typeface="+mj-lt"/>
+                <a:ea typeface="+mj-ea"/>
+                <a:cs typeface="+mj-cs"/>
+              </a:rPr>
+              <a:t>Dataset Description</a:t>
+            </a:r>
+          </a:p>
+        </p:txBody>
+      </p:sp>
+      <p:sp>
+        <p:nvSpPr>
+          <p:cNvPr id="55" name="Graphic 11">
+            <a:extLst>
+              <a:ext uri="{FF2B5EF4-FFF2-40B4-BE49-F238E27FC236}">
+                <a16:creationId xmlns:a16="http://schemas.microsoft.com/office/drawing/2014/main" id="{6CB927A4-E432-4310-9CD5-E89FF5063179}"/>
+              </a:ext>
+              <a:ext uri="{C183D7F6-B498-43B3-948B-1728B52AA6E4}">
+                <adec:decorative xmlns:adec="http://schemas.microsoft.com/office/drawing/2017/decorative" val="1"/>
+              </a:ext>
+            </a:extLst>
+          </p:cNvPr>
+          <p:cNvSpPr>
+            <a:spLocks noGrp="1" noRot="1" noChangeAspect="1" noMove="1" noResize="1" noEditPoints="1" noAdjustHandles="1" noChangeArrowheads="1" noChangeShapeType="1" noTextEdit="1"/>
+          </p:cNvSpPr>
+          <p:nvPr>
+            <p:extLst>
+              <p:ext uri="{386F3935-93C4-4BCD-93E2-E3B085C9AB24}">
+                <p16:designElem xmlns:p16="http://schemas.microsoft.com/office/powerpoint/2015/main" val="1"/>
+              </p:ext>
+            </p:extLst>
+          </p:nvPr>
+        </p:nvSpPr>
+        <p:spPr>
+          <a:xfrm>
+            <a:off x="1004956" y="703679"/>
+            <a:ext cx="171515" cy="171515"/>
+          </a:xfrm>
+          <a:custGeom>
+            <a:avLst/>
+            <a:gdLst>
+              <a:gd name="connsiteX0" fmla="*/ 159874 w 171515"/>
+              <a:gd name="connsiteY0" fmla="*/ 74116 h 171515"/>
+              <a:gd name="connsiteX1" fmla="*/ 97399 w 171515"/>
+              <a:gd name="connsiteY1" fmla="*/ 74116 h 171515"/>
+              <a:gd name="connsiteX2" fmla="*/ 97399 w 171515"/>
+              <a:gd name="connsiteY2" fmla="*/ 11641 h 171515"/>
+              <a:gd name="connsiteX3" fmla="*/ 85758 w 171515"/>
+              <a:gd name="connsiteY3" fmla="*/ 0 h 171515"/>
+              <a:gd name="connsiteX4" fmla="*/ 74116 w 171515"/>
+              <a:gd name="connsiteY4" fmla="*/ 11641 h 171515"/>
+              <a:gd name="connsiteX5" fmla="*/ 74116 w 171515"/>
+              <a:gd name="connsiteY5" fmla="*/ 74116 h 171515"/>
+              <a:gd name="connsiteX6" fmla="*/ 11641 w 171515"/>
+              <a:gd name="connsiteY6" fmla="*/ 74116 h 171515"/>
+              <a:gd name="connsiteX7" fmla="*/ 0 w 171515"/>
+              <a:gd name="connsiteY7" fmla="*/ 85758 h 171515"/>
+              <a:gd name="connsiteX8" fmla="*/ 11641 w 171515"/>
+              <a:gd name="connsiteY8" fmla="*/ 97399 h 171515"/>
+              <a:gd name="connsiteX9" fmla="*/ 74116 w 171515"/>
+              <a:gd name="connsiteY9" fmla="*/ 97399 h 171515"/>
+              <a:gd name="connsiteX10" fmla="*/ 74116 w 171515"/>
+              <a:gd name="connsiteY10" fmla="*/ 159874 h 171515"/>
+              <a:gd name="connsiteX11" fmla="*/ 85758 w 171515"/>
+              <a:gd name="connsiteY11" fmla="*/ 171515 h 171515"/>
+              <a:gd name="connsiteX12" fmla="*/ 97399 w 171515"/>
+              <a:gd name="connsiteY12" fmla="*/ 159874 h 171515"/>
+              <a:gd name="connsiteX13" fmla="*/ 97399 w 171515"/>
+              <a:gd name="connsiteY13" fmla="*/ 97399 h 171515"/>
+              <a:gd name="connsiteX14" fmla="*/ 159874 w 171515"/>
+              <a:gd name="connsiteY14" fmla="*/ 97399 h 171515"/>
+              <a:gd name="connsiteX15" fmla="*/ 171515 w 171515"/>
+              <a:gd name="connsiteY15" fmla="*/ 85758 h 171515"/>
+              <a:gd name="connsiteX16" fmla="*/ 159874 w 171515"/>
+              <a:gd name="connsiteY16" fmla="*/ 74116 h 171515"/>
+            </a:gdLst>
+            <a:ahLst/>
+            <a:cxnLst>
+              <a:cxn ang="0">
+                <a:pos x="connsiteX0" y="connsiteY0"/>
+              </a:cxn>
+              <a:cxn ang="0">
+                <a:pos x="connsiteX1" y="connsiteY1"/>
+              </a:cxn>
+              <a:cxn ang="0">
+                <a:pos x="connsiteX2" y="connsiteY2"/>
+              </a:cxn>
+              <a:cxn ang="0">
+                <a:pos x="connsiteX3" y="connsiteY3"/>
+              </a:cxn>
+              <a:cxn ang="0">
+                <a:pos x="connsiteX4" y="connsiteY4"/>
+              </a:cxn>
+              <a:cxn ang="0">
+                <a:pos x="connsiteX5" y="connsiteY5"/>
+              </a:cxn>
+              <a:cxn ang="0">
+                <a:pos x="connsiteX6" y="connsiteY6"/>
+              </a:cxn>
+              <a:cxn ang="0">
+                <a:pos x="connsiteX7" y="connsiteY7"/>
+              </a:cxn>
+              <a:cxn ang="0">
+                <a:pos x="connsiteX8" y="connsiteY8"/>
+              </a:cxn>
+              <a:cxn ang="0">
+                <a:pos x="connsiteX9" y="connsiteY9"/>
+              </a:cxn>
+              <a:cxn ang="0">
+                <a:pos x="connsiteX10" y="connsiteY10"/>
+              </a:cxn>
+              <a:cxn ang="0">
+                <a:pos x="connsiteX11" y="connsiteY11"/>
+              </a:cxn>
+              <a:cxn ang="0">
+                <a:pos x="connsiteX12" y="connsiteY12"/>
+              </a:cxn>
+              <a:cxn ang="0">
+                <a:pos x="connsiteX13" y="connsiteY13"/>
+              </a:cxn>
+              <a:cxn ang="0">
+                <a:pos x="connsiteX14" y="connsiteY14"/>
+              </a:cxn>
+              <a:cxn ang="0">
+                <a:pos x="connsiteX15" y="connsiteY15"/>
+              </a:cxn>
+              <a:cxn ang="0">
+                <a:pos x="connsiteX16" y="connsiteY16"/>
+              </a:cxn>
+            </a:cxnLst>
+            <a:rect l="l" t="t" r="r" b="b"/>
+            <a:pathLst>
+              <a:path w="171515" h="171515">
+                <a:moveTo>
+                  <a:pt x="159874" y="74116"/>
+                </a:moveTo>
+                <a:lnTo>
+                  <a:pt x="97399" y="74116"/>
+                </a:lnTo>
+                <a:lnTo>
+                  <a:pt x="97399" y="11641"/>
+                </a:lnTo>
+                <a:cubicBezTo>
+                  <a:pt x="97399" y="5212"/>
+                  <a:pt x="92187" y="0"/>
+                  <a:pt x="85758" y="0"/>
+                </a:cubicBezTo>
+                <a:cubicBezTo>
+                  <a:pt x="79328" y="0"/>
+                  <a:pt x="74116" y="5212"/>
+                  <a:pt x="74116" y="11641"/>
+                </a:cubicBezTo>
+                <a:lnTo>
+                  <a:pt x="74116" y="74116"/>
+                </a:lnTo>
+                <a:lnTo>
+                  <a:pt x="11641" y="74116"/>
+                </a:lnTo>
+                <a:cubicBezTo>
+                  <a:pt x="5212" y="74116"/>
+                  <a:pt x="0" y="79328"/>
+                  <a:pt x="0" y="85758"/>
+                </a:cubicBezTo>
+                <a:cubicBezTo>
+                  <a:pt x="0" y="92187"/>
+                  <a:pt x="5212" y="97399"/>
+                  <a:pt x="11641" y="97399"/>
+                </a:cubicBezTo>
+                <a:lnTo>
+                  <a:pt x="74116" y="97399"/>
+                </a:lnTo>
+                <a:lnTo>
+                  <a:pt x="74116" y="159874"/>
+                </a:lnTo>
+                <a:cubicBezTo>
+                  <a:pt x="74116" y="166303"/>
+                  <a:pt x="79328" y="171515"/>
+                  <a:pt x="85758" y="171515"/>
+                </a:cubicBezTo>
+                <a:cubicBezTo>
+                  <a:pt x="92187" y="171515"/>
+                  <a:pt x="97399" y="166303"/>
+                  <a:pt x="97399" y="159874"/>
+                </a:cubicBezTo>
+                <a:lnTo>
+                  <a:pt x="97399" y="97399"/>
+                </a:lnTo>
+                <a:lnTo>
+                  <a:pt x="159874" y="97399"/>
+                </a:lnTo>
+                <a:cubicBezTo>
+                  <a:pt x="166303" y="97399"/>
+                  <a:pt x="171515" y="92187"/>
+                  <a:pt x="171515" y="85758"/>
+                </a:cubicBezTo>
+                <a:cubicBezTo>
+                  <a:pt x="171515" y="79328"/>
+                  <a:pt x="166303" y="74116"/>
+                  <a:pt x="159874" y="74116"/>
+                </a:cubicBezTo>
+                <a:close/>
+              </a:path>
+            </a:pathLst>
+          </a:custGeom>
+          <a:solidFill>
+            <a:schemeClr val="accent2"/>
+          </a:solidFill>
+          <a:ln w="776" cap="flat">
+            <a:noFill/>
+            <a:prstDash val="solid"/>
+            <a:miter/>
+          </a:ln>
+        </p:spPr>
+        <p:txBody>
+          <a:bodyPr rtlCol="0" anchor="ctr"/>
+          <a:lstStyle/>
+          <a:p>
+            <a:endParaRPr lang="en-US"/>
+          </a:p>
+        </p:txBody>
+      </p:sp>
+      <p:sp>
+        <p:nvSpPr>
+          <p:cNvPr id="57" name="Graphic 12">
+            <a:extLst>
+              <a:ext uri="{FF2B5EF4-FFF2-40B4-BE49-F238E27FC236}">
+                <a16:creationId xmlns:a16="http://schemas.microsoft.com/office/drawing/2014/main" id="{1453BF6C-B012-48B7-B4E8-6D7AC7C27D02}"/>
+              </a:ext>
+              <a:ext uri="{C183D7F6-B498-43B3-948B-1728B52AA6E4}">
+                <adec:decorative xmlns:adec="http://schemas.microsoft.com/office/drawing/2017/decorative" val="1"/>
+              </a:ext>
+            </a:extLst>
+          </p:cNvPr>
+          <p:cNvSpPr>
+            <a:spLocks noGrp="1" noRot="1" noChangeAspect="1" noMove="1" noResize="1" noEditPoints="1" noAdjustHandles="1" noChangeArrowheads="1" noChangeShapeType="1" noTextEdit="1"/>
+          </p:cNvSpPr>
+          <p:nvPr>
+            <p:extLst>
+              <p:ext uri="{386F3935-93C4-4BCD-93E2-E3B085C9AB24}">
+                <p16:designElem xmlns:p16="http://schemas.microsoft.com/office/powerpoint/2015/main" val="1"/>
+              </p:ext>
+            </p:extLst>
+          </p:nvPr>
+        </p:nvSpPr>
+        <p:spPr>
+          <a:xfrm>
+            <a:off x="422753" y="1562696"/>
+            <a:ext cx="157545" cy="157545"/>
+          </a:xfrm>
+          <a:custGeom>
+            <a:avLst/>
+            <a:gdLst>
+              <a:gd name="connsiteX0" fmla="*/ 78773 w 157545"/>
+              <a:gd name="connsiteY0" fmla="*/ 23283 h 157545"/>
+              <a:gd name="connsiteX1" fmla="*/ 134262 w 157545"/>
+              <a:gd name="connsiteY1" fmla="*/ 78773 h 157545"/>
+              <a:gd name="connsiteX2" fmla="*/ 78773 w 157545"/>
+              <a:gd name="connsiteY2" fmla="*/ 134262 h 157545"/>
+              <a:gd name="connsiteX3" fmla="*/ 23283 w 157545"/>
+              <a:gd name="connsiteY3" fmla="*/ 78773 h 157545"/>
+              <a:gd name="connsiteX4" fmla="*/ 78773 w 157545"/>
+              <a:gd name="connsiteY4" fmla="*/ 23283 h 157545"/>
+              <a:gd name="connsiteX5" fmla="*/ 78773 w 157545"/>
+              <a:gd name="connsiteY5" fmla="*/ 0 h 157545"/>
+              <a:gd name="connsiteX6" fmla="*/ 0 w 157545"/>
+              <a:gd name="connsiteY6" fmla="*/ 78773 h 157545"/>
+              <a:gd name="connsiteX7" fmla="*/ 78773 w 157545"/>
+              <a:gd name="connsiteY7" fmla="*/ 157545 h 157545"/>
+              <a:gd name="connsiteX8" fmla="*/ 157545 w 157545"/>
+              <a:gd name="connsiteY8" fmla="*/ 78773 h 157545"/>
+              <a:gd name="connsiteX9" fmla="*/ 78773 w 157545"/>
+              <a:gd name="connsiteY9" fmla="*/ 0 h 157545"/>
+            </a:gdLst>
+            <a:ahLst/>
+            <a:cxnLst>
+              <a:cxn ang="0">
+                <a:pos x="connsiteX0" y="connsiteY0"/>
+              </a:cxn>
+              <a:cxn ang="0">
+                <a:pos x="connsiteX1" y="connsiteY1"/>
+              </a:cxn>
+              <a:cxn ang="0">
+                <a:pos x="connsiteX2" y="connsiteY2"/>
+              </a:cxn>
+              <a:cxn ang="0">
+                <a:pos x="connsiteX3" y="connsiteY3"/>
+              </a:cxn>
+              <a:cxn ang="0">
+                <a:pos x="connsiteX4" y="connsiteY4"/>
+              </a:cxn>
+              <a:cxn ang="0">
+                <a:pos x="connsiteX5" y="connsiteY5"/>
+              </a:cxn>
+              <a:cxn ang="0">
+                <a:pos x="connsiteX6" y="connsiteY6"/>
+              </a:cxn>
+              <a:cxn ang="0">
+                <a:pos x="connsiteX7" y="connsiteY7"/>
+              </a:cxn>
+              <a:cxn ang="0">
+                <a:pos x="connsiteX8" y="connsiteY8"/>
+              </a:cxn>
+              <a:cxn ang="0">
+                <a:pos x="connsiteX9" y="connsiteY9"/>
+              </a:cxn>
+            </a:cxnLst>
+            <a:rect l="l" t="t" r="r" b="b"/>
+            <a:pathLst>
+              <a:path w="157545" h="157545">
+                <a:moveTo>
+                  <a:pt x="78773" y="23283"/>
+                </a:moveTo>
+                <a:cubicBezTo>
+                  <a:pt x="109419" y="23283"/>
+                  <a:pt x="134262" y="48126"/>
+                  <a:pt x="134262" y="78773"/>
+                </a:cubicBezTo>
+                <a:cubicBezTo>
+                  <a:pt x="134262" y="109419"/>
+                  <a:pt x="109419" y="134262"/>
+                  <a:pt x="78773" y="134262"/>
+                </a:cubicBezTo>
+                <a:cubicBezTo>
+                  <a:pt x="48126" y="134262"/>
+                  <a:pt x="23283" y="109419"/>
+                  <a:pt x="23283" y="78773"/>
+                </a:cubicBezTo>
+                <a:cubicBezTo>
+                  <a:pt x="23312" y="48139"/>
+                  <a:pt x="48139" y="23312"/>
+                  <a:pt x="78773" y="23283"/>
+                </a:cubicBezTo>
+                <a:moveTo>
+                  <a:pt x="78773" y="0"/>
+                </a:moveTo>
+                <a:cubicBezTo>
+                  <a:pt x="35268" y="0"/>
+                  <a:pt x="0" y="35268"/>
+                  <a:pt x="0" y="78773"/>
+                </a:cubicBezTo>
+                <a:cubicBezTo>
+                  <a:pt x="0" y="122277"/>
+                  <a:pt x="35268" y="157545"/>
+                  <a:pt x="78773" y="157545"/>
+                </a:cubicBezTo>
+                <a:cubicBezTo>
+                  <a:pt x="122277" y="157545"/>
+                  <a:pt x="157545" y="122277"/>
+                  <a:pt x="157545" y="78773"/>
+                </a:cubicBezTo>
+                <a:cubicBezTo>
+                  <a:pt x="157545" y="35268"/>
+                  <a:pt x="122277" y="0"/>
+                  <a:pt x="78773" y="0"/>
+                </a:cubicBezTo>
+                <a:close/>
+              </a:path>
+            </a:pathLst>
+          </a:custGeom>
+          <a:solidFill>
+            <a:schemeClr val="accent2"/>
+          </a:solidFill>
+          <a:ln w="751" cap="flat">
+            <a:noFill/>
+            <a:prstDash val="solid"/>
+            <a:miter/>
+          </a:ln>
+        </p:spPr>
+        <p:txBody>
+          <a:bodyPr rtlCol="0" anchor="ctr"/>
+          <a:lstStyle/>
+          <a:p>
+            <a:endParaRPr lang="en-US"/>
+          </a:p>
+        </p:txBody>
+      </p:sp>
+      <p:sp>
+        <p:nvSpPr>
+          <p:cNvPr id="59" name="Freeform: Shape 58">
+            <a:extLst>
+              <a:ext uri="{FF2B5EF4-FFF2-40B4-BE49-F238E27FC236}">
+                <a16:creationId xmlns:a16="http://schemas.microsoft.com/office/drawing/2014/main" id="{C64EAE84-A813-4501-BC71-DBD14BA0265E}"/>
+              </a:ext>
+              <a:ext uri="{C183D7F6-B498-43B3-948B-1728B52AA6E4}">
+                <adec:decorative xmlns:adec="http://schemas.microsoft.com/office/drawing/2017/decorative" val="1"/>
+              </a:ext>
+            </a:extLst>
+          </p:cNvPr>
+          <p:cNvSpPr>
+            <a:spLocks noGrp="1" noRot="1" noChangeAspect="1" noMove="1" noResize="1" noEditPoints="1" noAdjustHandles="1" noChangeArrowheads="1" noChangeShapeType="1" noTextEdit="1"/>
+          </p:cNvSpPr>
+          <p:nvPr>
+            <p:extLst>
+              <p:ext uri="{386F3935-93C4-4BCD-93E2-E3B085C9AB24}">
+                <p16:designElem xmlns:p16="http://schemas.microsoft.com/office/powerpoint/2015/main" val="1"/>
+              </p:ext>
+            </p:extLst>
+          </p:nvPr>
+        </p:nvSpPr>
+        <p:spPr>
+          <a:xfrm>
+            <a:off x="2159782" y="1"/>
+            <a:ext cx="4195674" cy="3095741"/>
+          </a:xfrm>
+          <a:custGeom>
+            <a:avLst/>
+            <a:gdLst>
+              <a:gd name="connsiteX0" fmla="*/ 252211 w 4195674"/>
+              <a:gd name="connsiteY0" fmla="*/ 0 h 3095741"/>
+              <a:gd name="connsiteX1" fmla="*/ 3943464 w 4195674"/>
+              <a:gd name="connsiteY1" fmla="*/ 0 h 3095741"/>
+              <a:gd name="connsiteX2" fmla="*/ 4030816 w 4195674"/>
+              <a:gd name="connsiteY2" fmla="*/ 181331 h 3095741"/>
+              <a:gd name="connsiteX3" fmla="*/ 4195674 w 4195674"/>
+              <a:gd name="connsiteY3" fmla="*/ 997904 h 3095741"/>
+              <a:gd name="connsiteX4" fmla="*/ 2097837 w 4195674"/>
+              <a:gd name="connsiteY4" fmla="*/ 3095741 h 3095741"/>
+              <a:gd name="connsiteX5" fmla="*/ 0 w 4195674"/>
+              <a:gd name="connsiteY5" fmla="*/ 997904 h 3095741"/>
+              <a:gd name="connsiteX6" fmla="*/ 164859 w 4195674"/>
+              <a:gd name="connsiteY6" fmla="*/ 181331 h 3095741"/>
+            </a:gdLst>
+            <a:ahLst/>
+            <a:cxnLst>
+              <a:cxn ang="0">
+                <a:pos x="connsiteX0" y="connsiteY0"/>
+              </a:cxn>
+              <a:cxn ang="0">
+                <a:pos x="connsiteX1" y="connsiteY1"/>
+              </a:cxn>
+              <a:cxn ang="0">
+                <a:pos x="connsiteX2" y="connsiteY2"/>
+              </a:cxn>
+              <a:cxn ang="0">
+                <a:pos x="connsiteX3" y="connsiteY3"/>
+              </a:cxn>
+              <a:cxn ang="0">
+                <a:pos x="connsiteX4" y="connsiteY4"/>
+              </a:cxn>
+              <a:cxn ang="0">
+                <a:pos x="connsiteX5" y="connsiteY5"/>
+              </a:cxn>
+              <a:cxn ang="0">
+                <a:pos x="connsiteX6" y="connsiteY6"/>
+              </a:cxn>
+            </a:cxnLst>
+            <a:rect l="l" t="t" r="r" b="b"/>
+            <a:pathLst>
+              <a:path w="4195674" h="3095741">
+                <a:moveTo>
+                  <a:pt x="252211" y="0"/>
+                </a:moveTo>
+                <a:lnTo>
+                  <a:pt x="3943464" y="0"/>
+                </a:lnTo>
+                <a:lnTo>
+                  <a:pt x="4030816" y="181331"/>
+                </a:lnTo>
+                <a:cubicBezTo>
+                  <a:pt x="4136972" y="432313"/>
+                  <a:pt x="4195674" y="708253"/>
+                  <a:pt x="4195674" y="997904"/>
+                </a:cubicBezTo>
+                <a:cubicBezTo>
+                  <a:pt x="4195674" y="2156507"/>
+                  <a:pt x="3256440" y="3095741"/>
+                  <a:pt x="2097837" y="3095741"/>
+                </a:cubicBezTo>
+                <a:cubicBezTo>
+                  <a:pt x="939234" y="3095741"/>
+                  <a:pt x="0" y="2156507"/>
+                  <a:pt x="0" y="997904"/>
+                </a:cubicBezTo>
+                <a:cubicBezTo>
+                  <a:pt x="0" y="708253"/>
+                  <a:pt x="58702" y="432313"/>
+                  <a:pt x="164859" y="181331"/>
+                </a:cubicBezTo>
+                <a:close/>
+              </a:path>
+            </a:pathLst>
+          </a:custGeom>
+          <a:gradFill flip="none" rotWithShape="1">
+            <a:gsLst>
+              <a:gs pos="100000">
+                <a:schemeClr val="accent4"/>
+              </a:gs>
+              <a:gs pos="0">
+                <a:schemeClr val="accent2"/>
+              </a:gs>
+            </a:gsLst>
+            <a:lin ang="2700000" scaled="1"/>
+            <a:tileRect/>
+          </a:gradFill>
+          <a:ln>
+            <a:noFill/>
+          </a:ln>
+        </p:spPr>
+        <p:style>
+          <a:lnRef idx="2">
+            <a:schemeClr val="accent1">
+              <a:shade val="50000"/>
+            </a:schemeClr>
+          </a:lnRef>
+          <a:fillRef idx="1">
+            <a:schemeClr val="accent1"/>
+          </a:fillRef>
+          <a:effectRef idx="0">
+            <a:schemeClr val="accent1"/>
+          </a:effectRef>
+          <a:fontRef idx="minor">
+            <a:schemeClr val="lt1"/>
+          </a:fontRef>
+        </p:style>
+        <p:txBody>
+          <a:bodyPr rot="0" spcFirstLastPara="0" vertOverflow="overflow" horzOverflow="overflow" vert="horz" wrap="square" lIns="91440" tIns="45720" rIns="91440" bIns="45720" numCol="1" spcCol="0" rtlCol="0" fromWordArt="0" anchor="ctr" anchorCtr="0" forceAA="0" compatLnSpc="1">
+            <a:prstTxWarp prst="textNoShape">
+              <a:avLst/>
+            </a:prstTxWarp>
+            <a:noAutofit/>
+          </a:bodyPr>
+          <a:lstStyle/>
+          <a:p>
+            <a:pPr algn="ctr"/>
+            <a:endParaRPr lang="en-US"/>
+          </a:p>
+        </p:txBody>
+      </p:sp>
+      <p:pic>
+        <p:nvPicPr>
+          <p:cNvPr id="8" name="Gráfico 7" descr="Utilizador com preenchimento sólido">
+            <a:extLst>
+              <a:ext uri="{FF2B5EF4-FFF2-40B4-BE49-F238E27FC236}">
+                <a16:creationId xmlns:a16="http://schemas.microsoft.com/office/drawing/2014/main" id="{78D0ADBA-0738-F9A2-B418-7CFE3D2DA014}"/>
+              </a:ext>
+            </a:extLst>
+          </p:cNvPr>
+          <p:cNvPicPr>
+            <a:picLocks noChangeAspect="1"/>
+          </p:cNvPicPr>
+          <p:nvPr/>
+        </p:nvPicPr>
+        <p:blipFill>
+          <a:blip r:embed="rId2">
+            <a:extLst>
+              <a:ext uri="{28A0092B-C50C-407E-A947-70E740481C1C}">
+                <a14:useLocalDpi xmlns:a14="http://schemas.microsoft.com/office/drawing/2010/main" val="0"/>
+              </a:ext>
+              <a:ext uri="{96DAC541-7B7A-43D3-8B79-37D633B846F1}">
+                <asvg:svgBlip xmlns:asvg="http://schemas.microsoft.com/office/drawing/2016/SVG/main" r:embed="rId3"/>
+              </a:ext>
+            </a:extLst>
+          </a:blip>
+          <a:stretch/>
+        </p:blipFill>
+        <p:spPr>
+          <a:xfrm>
+            <a:off x="3036211" y="165871"/>
+            <a:ext cx="2353922" cy="2353922"/>
+          </a:xfrm>
+          <a:prstGeom prst="rect">
+            <a:avLst/>
+          </a:prstGeom>
+        </p:spPr>
+      </p:pic>
+      <p:sp>
+        <p:nvSpPr>
+          <p:cNvPr id="61" name="Freeform: Shape 60">
+            <a:extLst>
+              <a:ext uri="{FF2B5EF4-FFF2-40B4-BE49-F238E27FC236}">
+                <a16:creationId xmlns:a16="http://schemas.microsoft.com/office/drawing/2014/main" id="{AB673405-BF85-493E-8558-0DCBEDB2BB49}"/>
+              </a:ext>
+              <a:ext uri="{C183D7F6-B498-43B3-948B-1728B52AA6E4}">
+                <adec:decorative xmlns:adec="http://schemas.microsoft.com/office/drawing/2017/decorative" val="1"/>
+              </a:ext>
+            </a:extLst>
+          </p:cNvPr>
+          <p:cNvSpPr>
+            <a:spLocks noGrp="1" noRot="1" noChangeAspect="1" noMove="1" noResize="1" noEditPoints="1" noAdjustHandles="1" noChangeArrowheads="1" noChangeShapeType="1" noTextEdit="1"/>
+          </p:cNvSpPr>
+          <p:nvPr>
+            <p:extLst>
+              <p:ext uri="{386F3935-93C4-4BCD-93E2-E3B085C9AB24}">
+                <p16:designElem xmlns:p16="http://schemas.microsoft.com/office/powerpoint/2015/main" val="1"/>
+              </p:ext>
+            </p:extLst>
+          </p:nvPr>
+        </p:nvSpPr>
+        <p:spPr>
+          <a:xfrm>
+            <a:off x="0" y="2779610"/>
+            <a:ext cx="4831130" cy="4078390"/>
+          </a:xfrm>
+          <a:custGeom>
+            <a:avLst/>
+            <a:gdLst>
+              <a:gd name="connsiteX0" fmla="*/ 1960035 w 4831130"/>
+              <a:gd name="connsiteY0" fmla="*/ 0 h 4078390"/>
+              <a:gd name="connsiteX1" fmla="*/ 4831130 w 4831130"/>
+              <a:gd name="connsiteY1" fmla="*/ 2871095 h 4078390"/>
+              <a:gd name="connsiteX2" fmla="*/ 4605505 w 4831130"/>
+              <a:gd name="connsiteY2" fmla="*/ 3988655 h 4078390"/>
+              <a:gd name="connsiteX3" fmla="*/ 4562278 w 4831130"/>
+              <a:gd name="connsiteY3" fmla="*/ 4078390 h 4078390"/>
+              <a:gd name="connsiteX4" fmla="*/ 0 w 4831130"/>
+              <a:gd name="connsiteY4" fmla="*/ 4078390 h 4078390"/>
+              <a:gd name="connsiteX5" fmla="*/ 0 w 4831130"/>
+              <a:gd name="connsiteY5" fmla="*/ 777181 h 4078390"/>
+              <a:gd name="connsiteX6" fmla="*/ 133752 w 4831130"/>
+              <a:gd name="connsiteY6" fmla="*/ 655619 h 4078390"/>
+              <a:gd name="connsiteX7" fmla="*/ 1960035 w 4831130"/>
+              <a:gd name="connsiteY7" fmla="*/ 0 h 4078390"/>
+            </a:gdLst>
+            <a:ahLst/>
+            <a:cxnLst>
+              <a:cxn ang="0">
+                <a:pos x="connsiteX0" y="connsiteY0"/>
+              </a:cxn>
+              <a:cxn ang="0">
+                <a:pos x="connsiteX1" y="connsiteY1"/>
+              </a:cxn>
+              <a:cxn ang="0">
+                <a:pos x="connsiteX2" y="connsiteY2"/>
+              </a:cxn>
+              <a:cxn ang="0">
+                <a:pos x="connsiteX3" y="connsiteY3"/>
+              </a:cxn>
+              <a:cxn ang="0">
+                <a:pos x="connsiteX4" y="connsiteY4"/>
+              </a:cxn>
+              <a:cxn ang="0">
+                <a:pos x="connsiteX5" y="connsiteY5"/>
+              </a:cxn>
+              <a:cxn ang="0">
+                <a:pos x="connsiteX6" y="connsiteY6"/>
+              </a:cxn>
+              <a:cxn ang="0">
+                <a:pos x="connsiteX7" y="connsiteY7"/>
+              </a:cxn>
+            </a:cxnLst>
+            <a:rect l="l" t="t" r="r" b="b"/>
+            <a:pathLst>
+              <a:path w="4831130" h="4078390">
+                <a:moveTo>
+                  <a:pt x="1960035" y="0"/>
+                </a:moveTo>
+                <a:cubicBezTo>
+                  <a:pt x="3545697" y="0"/>
+                  <a:pt x="4831130" y="1285433"/>
+                  <a:pt x="4831130" y="2871095"/>
+                </a:cubicBezTo>
+                <a:cubicBezTo>
+                  <a:pt x="4831130" y="3267511"/>
+                  <a:pt x="4750791" y="3645162"/>
+                  <a:pt x="4605505" y="3988655"/>
+                </a:cubicBezTo>
+                <a:lnTo>
+                  <a:pt x="4562278" y="4078390"/>
+                </a:lnTo>
+                <a:lnTo>
+                  <a:pt x="0" y="4078390"/>
+                </a:lnTo>
+                <a:lnTo>
+                  <a:pt x="0" y="777181"/>
+                </a:lnTo>
+                <a:lnTo>
+                  <a:pt x="133752" y="655619"/>
+                </a:lnTo>
+                <a:cubicBezTo>
+                  <a:pt x="630047" y="246040"/>
+                  <a:pt x="1266308" y="0"/>
+                  <a:pt x="1960035" y="0"/>
+                </a:cubicBezTo>
+                <a:close/>
+              </a:path>
+            </a:pathLst>
+          </a:custGeom>
+          <a:gradFill flip="none" rotWithShape="1">
+            <a:gsLst>
+              <a:gs pos="100000">
+                <a:schemeClr val="accent4"/>
+              </a:gs>
+              <a:gs pos="0">
+                <a:schemeClr val="accent2"/>
+              </a:gs>
+            </a:gsLst>
+            <a:lin ang="2700000" scaled="1"/>
+            <a:tileRect/>
+          </a:gradFill>
+          <a:ln>
+            <a:noFill/>
+          </a:ln>
+        </p:spPr>
+        <p:style>
+          <a:lnRef idx="2">
+            <a:schemeClr val="accent1">
+              <a:shade val="50000"/>
+            </a:schemeClr>
+          </a:lnRef>
+          <a:fillRef idx="1">
+            <a:schemeClr val="accent1"/>
+          </a:fillRef>
+          <a:effectRef idx="0">
+            <a:schemeClr val="accent1"/>
+          </a:effectRef>
+          <a:fontRef idx="minor">
+            <a:schemeClr val="lt1"/>
+          </a:fontRef>
+        </p:style>
+        <p:txBody>
+          <a:bodyPr rot="0" spcFirstLastPara="0" vertOverflow="overflow" horzOverflow="overflow" vert="horz" wrap="square" lIns="91440" tIns="45720" rIns="91440" bIns="45720" numCol="1" spcCol="0" rtlCol="0" fromWordArt="0" anchor="ctr" anchorCtr="0" forceAA="0" compatLnSpc="1">
+            <a:prstTxWarp prst="textNoShape">
+              <a:avLst/>
+            </a:prstTxWarp>
+            <a:noAutofit/>
+          </a:bodyPr>
+          <a:lstStyle/>
+          <a:p>
+            <a:pPr algn="ctr"/>
+            <a:endParaRPr lang="en-US"/>
+          </a:p>
+        </p:txBody>
+      </p:sp>
+      <p:pic>
+        <p:nvPicPr>
+          <p:cNvPr id="9" name="Gráfico 8" descr="Prancheta com preenchimento sólido">
+            <a:extLst>
+              <a:ext uri="{FF2B5EF4-FFF2-40B4-BE49-F238E27FC236}">
+                <a16:creationId xmlns:a16="http://schemas.microsoft.com/office/drawing/2014/main" id="{AD270DF0-20CB-8F7A-D9FC-8204CFB56192}"/>
+              </a:ext>
+            </a:extLst>
+          </p:cNvPr>
+          <p:cNvPicPr>
+            <a:picLocks noChangeAspect="1"/>
+          </p:cNvPicPr>
+          <p:nvPr/>
+        </p:nvPicPr>
+        <p:blipFill>
+          <a:blip r:embed="rId4">
+            <a:extLst>
+              <a:ext uri="{28A0092B-C50C-407E-A947-70E740481C1C}">
+                <a14:useLocalDpi xmlns:a14="http://schemas.microsoft.com/office/drawing/2010/main" val="0"/>
+              </a:ext>
+              <a:ext uri="{96DAC541-7B7A-43D3-8B79-37D633B846F1}">
+                <asvg:svgBlip xmlns:asvg="http://schemas.microsoft.com/office/drawing/2016/SVG/main" r:embed="rId5"/>
+              </a:ext>
+            </a:extLst>
+          </a:blip>
+          <a:stretch>
+            <a:fillRect/>
+          </a:stretch>
+        </p:blipFill>
+        <p:spPr>
+          <a:xfrm>
+            <a:off x="705154" y="3684772"/>
+            <a:ext cx="2752751" cy="2752751"/>
+          </a:xfrm>
+          <a:prstGeom prst="rect">
+            <a:avLst/>
+          </a:prstGeom>
+        </p:spPr>
+      </p:pic>
+      <p:sp>
+        <p:nvSpPr>
+          <p:cNvPr id="10" name="Marcador de Posição de Conteúdo 9">
+            <a:extLst>
+              <a:ext uri="{FF2B5EF4-FFF2-40B4-BE49-F238E27FC236}">
+                <a16:creationId xmlns:a16="http://schemas.microsoft.com/office/drawing/2014/main" id="{11E5765F-7BCF-A33E-C17E-B683EDCA27A5}"/>
+              </a:ext>
+            </a:extLst>
+          </p:cNvPr>
+          <p:cNvSpPr>
+            <a:spLocks noGrp="1"/>
+          </p:cNvSpPr>
+          <p:nvPr>
+            <p:ph idx="1"/>
+          </p:nvPr>
+        </p:nvSpPr>
+        <p:spPr>
+          <a:xfrm>
+            <a:off x="6007786" y="2859312"/>
+            <a:ext cx="5137165" cy="3659169"/>
+          </a:xfrm>
+        </p:spPr>
+        <p:txBody>
+          <a:bodyPr vert="horz" lIns="91440" tIns="45720" rIns="91440" bIns="45720" rtlCol="0" anchor="t">
+            <a:normAutofit/>
+          </a:bodyPr>
+          <a:lstStyle/>
+          <a:p>
+            <a:pPr algn="just"/>
+            <a:r>
+              <a:rPr lang="en-US" sz="1800" dirty="0"/>
+              <a:t>The dataset is mainly composed of these two entities, </a:t>
+            </a:r>
+            <a:r>
+              <a:rPr lang="en-US" sz="1800" b="1" dirty="0"/>
+              <a:t>reviews</a:t>
+            </a:r>
+            <a:r>
+              <a:rPr lang="en-US" sz="1800" dirty="0"/>
+              <a:t> and </a:t>
+            </a:r>
+            <a:r>
+              <a:rPr lang="en-US" sz="1800" b="1" dirty="0"/>
+              <a:t>users</a:t>
+            </a:r>
+            <a:r>
+              <a:rPr lang="en-US" sz="1800" dirty="0"/>
+              <a:t>, which is comprehensive, as Yelp main focus is giving users a platform to make reviews.</a:t>
+            </a:r>
+          </a:p>
+          <a:p>
+            <a:pPr algn="just"/>
+            <a:r>
+              <a:rPr lang="en-US" sz="1800" dirty="0"/>
+              <a:t>A review </a:t>
+            </a:r>
+            <a:r>
+              <a:rPr lang="en-US" sz="1800" b="1" dirty="0"/>
+              <a:t>links</a:t>
+            </a:r>
+            <a:r>
+              <a:rPr lang="en-US" sz="1800" dirty="0"/>
+              <a:t> a </a:t>
+            </a:r>
+            <a:r>
+              <a:rPr lang="en-US" sz="1800" b="1" dirty="0"/>
+              <a:t>user</a:t>
+            </a:r>
+            <a:r>
+              <a:rPr lang="en-US" sz="1800" dirty="0"/>
+              <a:t> and a </a:t>
+            </a:r>
+            <a:r>
+              <a:rPr lang="en-US" sz="1800" b="1" dirty="0"/>
+              <a:t>business</a:t>
+            </a:r>
+            <a:r>
+              <a:rPr lang="en-US" sz="1800" dirty="0"/>
+              <a:t>, through their respective ids and it is also linked to a </a:t>
+            </a:r>
+            <a:r>
+              <a:rPr lang="en-US" sz="1800" b="1" dirty="0"/>
+              <a:t>date</a:t>
+            </a:r>
+            <a:r>
+              <a:rPr lang="en-US" sz="1800" dirty="0"/>
+              <a:t>. Additionally, it is composed of the </a:t>
+            </a:r>
+            <a:r>
+              <a:rPr lang="en-US" sz="1800" b="1" dirty="0"/>
+              <a:t>text</a:t>
+            </a:r>
+            <a:r>
+              <a:rPr lang="en-US" sz="1800" dirty="0"/>
+              <a:t>, </a:t>
+            </a:r>
+            <a:r>
+              <a:rPr lang="en-US" sz="1800" b="1" dirty="0"/>
+              <a:t>stars</a:t>
+            </a:r>
+            <a:r>
+              <a:rPr lang="en-US" sz="1800" dirty="0"/>
+              <a:t> rating, as well as 3 different </a:t>
+            </a:r>
+            <a:r>
+              <a:rPr lang="en-US" sz="1800" b="1" dirty="0"/>
+              <a:t>vote</a:t>
+            </a:r>
+            <a:r>
+              <a:rPr lang="en-US" sz="1800" dirty="0"/>
+              <a:t> types, over the review itself (useful, funny, cool).</a:t>
+            </a:r>
+          </a:p>
+          <a:p>
+            <a:pPr algn="just"/>
+            <a:r>
+              <a:rPr lang="en-US" sz="1800" dirty="0"/>
+              <a:t>A user is mainly composed of its </a:t>
+            </a:r>
+            <a:r>
+              <a:rPr lang="en-US" sz="1800" b="1" dirty="0"/>
+              <a:t>name</a:t>
+            </a:r>
+            <a:r>
+              <a:rPr lang="en-US" sz="1800" dirty="0"/>
+              <a:t>, </a:t>
+            </a:r>
+            <a:r>
+              <a:rPr lang="en-US" sz="1800" b="1" dirty="0"/>
+              <a:t>review, votes, fans and compliments’ counts</a:t>
+            </a:r>
+            <a:r>
+              <a:rPr lang="en-US" sz="1800" dirty="0"/>
+              <a:t>, yelp </a:t>
+            </a:r>
+            <a:r>
+              <a:rPr lang="en-US" sz="1800" b="1" dirty="0"/>
+              <a:t>joining date</a:t>
+            </a:r>
+            <a:r>
+              <a:rPr lang="en-US" sz="1800" dirty="0"/>
+              <a:t>, its </a:t>
+            </a:r>
+            <a:r>
+              <a:rPr lang="en-US" sz="1800" b="1" dirty="0"/>
+              <a:t>friends’ list </a:t>
+            </a:r>
+            <a:r>
+              <a:rPr lang="en-US" sz="1800" dirty="0"/>
+              <a:t>and the </a:t>
+            </a:r>
+            <a:r>
+              <a:rPr lang="en-US" sz="1800" b="1" dirty="0"/>
+              <a:t>average starts rating </a:t>
+            </a:r>
+            <a:r>
+              <a:rPr lang="en-US" sz="1800" dirty="0"/>
+              <a:t>given by that same user.</a:t>
+            </a:r>
+          </a:p>
+        </p:txBody>
+      </p:sp>
+      <p:sp>
+        <p:nvSpPr>
+          <p:cNvPr id="63" name="Graphic 10">
+            <a:extLst>
+              <a:ext uri="{FF2B5EF4-FFF2-40B4-BE49-F238E27FC236}">
+                <a16:creationId xmlns:a16="http://schemas.microsoft.com/office/drawing/2014/main" id="{E3020543-B24B-4EC4-8FFC-8DD88EEA91A8}"/>
+              </a:ext>
+              <a:ext uri="{C183D7F6-B498-43B3-948B-1728B52AA6E4}">
+                <adec:decorative xmlns:adec="http://schemas.microsoft.com/office/drawing/2017/decorative" val="1"/>
+              </a:ext>
+            </a:extLst>
+          </p:cNvPr>
+          <p:cNvSpPr>
+            <a:spLocks noGrp="1" noRot="1" noChangeAspect="1" noMove="1" noResize="1" noEditPoints="1" noAdjustHandles="1" noChangeArrowheads="1" noChangeShapeType="1" noTextEdit="1"/>
+          </p:cNvSpPr>
+          <p:nvPr>
+            <p:extLst>
+              <p:ext uri="{386F3935-93C4-4BCD-93E2-E3B085C9AB24}">
+                <p16:designElem xmlns:p16="http://schemas.microsoft.com/office/powerpoint/2015/main" val="1"/>
+              </p:ext>
+            </p:extLst>
+          </p:nvPr>
+        </p:nvSpPr>
+        <p:spPr>
+          <a:xfrm>
+            <a:off x="5454149" y="5775082"/>
+            <a:ext cx="112426" cy="112426"/>
+          </a:xfrm>
+          <a:custGeom>
+            <a:avLst/>
+            <a:gdLst>
+              <a:gd name="connsiteX0" fmla="*/ 112426 w 112426"/>
+              <a:gd name="connsiteY0" fmla="*/ 56213 h 112426"/>
+              <a:gd name="connsiteX1" fmla="*/ 56213 w 112426"/>
+              <a:gd name="connsiteY1" fmla="*/ 112426 h 112426"/>
+              <a:gd name="connsiteX2" fmla="*/ 0 w 112426"/>
+              <a:gd name="connsiteY2" fmla="*/ 56213 h 112426"/>
+              <a:gd name="connsiteX3" fmla="*/ 56213 w 112426"/>
+              <a:gd name="connsiteY3" fmla="*/ 0 h 112426"/>
+              <a:gd name="connsiteX4" fmla="*/ 112426 w 112426"/>
+              <a:gd name="connsiteY4" fmla="*/ 56213 h 112426"/>
+            </a:gdLst>
+            <a:ahLst/>
+            <a:cxnLst>
+              <a:cxn ang="0">
+                <a:pos x="connsiteX0" y="connsiteY0"/>
+              </a:cxn>
+              <a:cxn ang="0">
+                <a:pos x="connsiteX1" y="connsiteY1"/>
+              </a:cxn>
+              <a:cxn ang="0">
+                <a:pos x="connsiteX2" y="connsiteY2"/>
+              </a:cxn>
+              <a:cxn ang="0">
+                <a:pos x="connsiteX3" y="connsiteY3"/>
+              </a:cxn>
+              <a:cxn ang="0">
+                <a:pos x="connsiteX4" y="connsiteY4"/>
+              </a:cxn>
+            </a:cxnLst>
+            <a:rect l="l" t="t" r="r" b="b"/>
+            <a:pathLst>
+              <a:path w="112426" h="112426">
+                <a:moveTo>
+                  <a:pt x="112426" y="56213"/>
+                </a:moveTo>
+                <a:cubicBezTo>
+                  <a:pt x="112426" y="87259"/>
+                  <a:pt x="87259" y="112426"/>
+                  <a:pt x="56213" y="112426"/>
+                </a:cubicBezTo>
+                <a:cubicBezTo>
+                  <a:pt x="25167" y="112426"/>
+                  <a:pt x="0" y="87259"/>
+                  <a:pt x="0" y="56213"/>
+                </a:cubicBezTo>
+                <a:cubicBezTo>
+                  <a:pt x="0" y="25167"/>
+                  <a:pt x="25167" y="0"/>
+                  <a:pt x="56213" y="0"/>
+                </a:cubicBezTo>
+                <a:cubicBezTo>
+                  <a:pt x="87259" y="0"/>
+                  <a:pt x="112426" y="25167"/>
+                  <a:pt x="112426" y="56213"/>
+                </a:cubicBezTo>
+                <a:close/>
+              </a:path>
+            </a:pathLst>
+          </a:custGeom>
+          <a:solidFill>
+            <a:schemeClr val="accent2"/>
+          </a:solidFill>
+          <a:ln w="516" cap="flat">
+            <a:noFill/>
+            <a:prstDash val="solid"/>
+            <a:miter/>
+          </a:ln>
+        </p:spPr>
+        <p:txBody>
+          <a:bodyPr rtlCol="0" anchor="ctr"/>
+          <a:lstStyle/>
+          <a:p>
+            <a:endParaRPr lang="en-US"/>
+          </a:p>
+        </p:txBody>
+      </p:sp>
+      <p:cxnSp>
+        <p:nvCxnSpPr>
+          <p:cNvPr id="65" name="Straight Connector 64">
+            <a:extLst>
+              <a:ext uri="{FF2B5EF4-FFF2-40B4-BE49-F238E27FC236}">
+                <a16:creationId xmlns:a16="http://schemas.microsoft.com/office/drawing/2014/main" id="{C49DA8F6-BCC1-4447-B54C-57856834B94B}"/>
+              </a:ext>
+              <a:ext uri="{C183D7F6-B498-43B3-948B-1728B52AA6E4}">
+                <adec:decorative xmlns:adec="http://schemas.microsoft.com/office/drawing/2017/decorative" val="1"/>
+              </a:ext>
+            </a:extLst>
+          </p:cNvPr>
+          <p:cNvCxnSpPr>
+            <a:cxnSpLocks noGrp="1" noRot="1" noChangeAspect="1" noMove="1" noResize="1" noEditPoints="1" noAdjustHandles="1" noChangeArrowheads="1" noChangeShapeType="1"/>
+          </p:cNvCxnSpPr>
+          <p:nvPr>
+            <p:extLst>
+              <p:ext uri="{386F3935-93C4-4BCD-93E2-E3B085C9AB24}">
+                <p16:designElem xmlns:p16="http://schemas.microsoft.com/office/powerpoint/2015/main" val="1"/>
+              </p:ext>
+            </p:extLst>
+          </p:nvPr>
+        </p:nvCxnSpPr>
+        <p:spPr>
+          <a:xfrm>
+            <a:off x="11586162" y="3610394"/>
+            <a:ext cx="0" cy="3238728"/>
+          </a:xfrm>
+          <a:prstGeom prst="line">
+            <a:avLst/>
+          </a:prstGeom>
+          <a:ln w="25400" cap="sq">
+            <a:gradFill flip="none" rotWithShape="1">
+              <a:gsLst>
+                <a:gs pos="0">
+                  <a:schemeClr val="accent2"/>
+                </a:gs>
+                <a:gs pos="100000">
+                  <a:schemeClr val="accent4"/>
+                </a:gs>
+              </a:gsLst>
+              <a:lin ang="16200000" scaled="1"/>
+              <a:tileRect/>
+            </a:gradFill>
+            <a:bevel/>
+          </a:ln>
+        </p:spPr>
+        <p:style>
+          <a:lnRef idx="1">
+            <a:schemeClr val="accent1"/>
+          </a:lnRef>
+          <a:fillRef idx="0">
+            <a:schemeClr val="accent1"/>
+          </a:fillRef>
+          <a:effectRef idx="0">
+            <a:schemeClr val="accent1"/>
+          </a:effectRef>
+          <a:fontRef idx="minor">
+            <a:schemeClr val="tx1"/>
+          </a:fontRef>
+        </p:style>
+      </p:cxnSp>
+    </p:spTree>
+    <p:extLst>
+      <p:ext uri="{BB962C8B-B14F-4D97-AF65-F5344CB8AC3E}">
+        <p14:creationId xmlns:p14="http://schemas.microsoft.com/office/powerpoint/2010/main" val="3333601270"/>
+      </p:ext>
+    </p:extLst>
+  </p:cSld>
+  <p:clrMapOvr>
+    <a:masterClrMapping/>
+  </p:clrMapOvr>
+</p:sld>
+</file>
+
+<file path=ppt/slides/slide4.xml><?xml version="1.0" encoding="utf-8"?>
+<p:sld xmlns:a="http://schemas.openxmlformats.org/drawingml/2006/main" xmlns:r="http://schemas.openxmlformats.org/officeDocument/2006/relationships" xmlns:p="http://schemas.openxmlformats.org/presentationml/2006/main">
+  <p:cSld>
+    <p:bg>
+      <p:bgPr>
+        <a:solidFill>
+          <a:schemeClr val="bg1"/>
+        </a:solidFill>
+        <a:effectLst/>
+      </p:bgPr>
+    </p:bg>
+    <p:spTree>
+      <p:nvGrpSpPr>
+        <p:cNvPr id="1" name=""/>
+        <p:cNvGrpSpPr/>
+        <p:nvPr/>
+      </p:nvGrpSpPr>
+      <p:grpSpPr>
+        <a:xfrm>
+          <a:off x="0" y="0"/>
+          <a:ext cx="0" cy="0"/>
+          <a:chOff x="0" y="0"/>
+          <a:chExt cx="0" cy="0"/>
+        </a:xfrm>
+      </p:grpSpPr>
+      <p:sp useBgFill="1">
+        <p:nvSpPr>
+          <p:cNvPr id="55" name="Rectangle 54">
+            <a:extLst>
+              <a:ext uri="{FF2B5EF4-FFF2-40B4-BE49-F238E27FC236}">
+                <a16:creationId xmlns:a16="http://schemas.microsoft.com/office/drawing/2014/main" id="{327D73B4-9F5C-4A64-A179-51B9500CB8B5}"/>
+              </a:ext>
+              <a:ext uri="{C183D7F6-B498-43B3-948B-1728B52AA6E4}">
+                <adec:decorative xmlns:adec="http://schemas.microsoft.com/office/drawing/2017/decorative" val="1"/>
+              </a:ext>
+            </a:extLst>
+          </p:cNvPr>
+          <p:cNvSpPr>
+            <a:spLocks noGrp="1" noRot="1" noChangeAspect="1" noMove="1" noResize="1" noEditPoints="1" noAdjustHandles="1" noChangeArrowheads="1" noChangeShapeType="1" noTextEdit="1"/>
+          </p:cNvSpPr>
+          <p:nvPr>
+            <p:extLst>
+              <p:ext uri="{386F3935-93C4-4BCD-93E2-E3B085C9AB24}">
+                <p16:designElem xmlns:p16="http://schemas.microsoft.com/office/powerpoint/2015/main" val="1"/>
+              </p:ext>
+            </p:extLst>
+          </p:nvPr>
+        </p:nvSpPr>
+        <p:spPr>
+          <a:xfrm>
+            <a:off x="0" y="0"/>
+            <a:ext cx="12192000" cy="6858000"/>
+          </a:xfrm>
+          <a:prstGeom prst="rect">
+            <a:avLst/>
+          </a:prstGeom>
+          <a:ln>
+            <a:noFill/>
+          </a:ln>
+        </p:spPr>
+        <p:style>
+          <a:lnRef idx="2">
+            <a:schemeClr val="accent1">
+              <a:shade val="50000"/>
+            </a:schemeClr>
+          </a:lnRef>
+          <a:fillRef idx="1">
+            <a:schemeClr val="accent1"/>
+          </a:fillRef>
+          <a:effectRef idx="0">
+            <a:schemeClr val="accent1"/>
+          </a:effectRef>
+          <a:fontRef idx="minor">
+            <a:schemeClr val="lt1"/>
+          </a:fontRef>
+        </p:style>
+        <p:txBody>
+          <a:bodyPr rtlCol="0" anchor="ctr"/>
+          <a:lstStyle/>
+          <a:p>
+            <a:pPr algn="ctr"/>
+            <a:endParaRPr lang="en-US" dirty="0"/>
+          </a:p>
+        </p:txBody>
+      </p:sp>
+      <p:sp>
+        <p:nvSpPr>
+          <p:cNvPr id="12" name="Título 11">
+            <a:extLst>
+              <a:ext uri="{FF2B5EF4-FFF2-40B4-BE49-F238E27FC236}">
+                <a16:creationId xmlns:a16="http://schemas.microsoft.com/office/drawing/2014/main" id="{8E377F1F-02A1-98B6-DB3E-54B40C793A43}"/>
+              </a:ext>
+            </a:extLst>
+          </p:cNvPr>
+          <p:cNvSpPr>
+            <a:spLocks noGrp="1"/>
+          </p:cNvSpPr>
+          <p:nvPr>
+            <p:ph type="title"/>
+          </p:nvPr>
+        </p:nvSpPr>
+        <p:spPr>
+          <a:xfrm>
+            <a:off x="6977031" y="467271"/>
+            <a:ext cx="3876357" cy="2052522"/>
+          </a:xfrm>
+        </p:spPr>
+        <p:txBody>
+          <a:bodyPr vert="horz" lIns="91440" tIns="45720" rIns="91440" bIns="45720" rtlCol="0" anchor="b">
+            <a:normAutofit/>
+          </a:bodyPr>
+          <a:lstStyle/>
+          <a:p>
+            <a:r>
+              <a:rPr lang="en-US" b="1" kern="1200">
+                <a:latin typeface="+mj-lt"/>
+                <a:ea typeface="+mj-ea"/>
+                <a:cs typeface="+mj-cs"/>
+              </a:rPr>
+              <a:t>Dataset Description</a:t>
+            </a:r>
+          </a:p>
+        </p:txBody>
+      </p:sp>
+      <p:sp>
+        <p:nvSpPr>
+          <p:cNvPr id="57" name="Freeform: Shape 56">
+            <a:extLst>
+              <a:ext uri="{FF2B5EF4-FFF2-40B4-BE49-F238E27FC236}">
+                <a16:creationId xmlns:a16="http://schemas.microsoft.com/office/drawing/2014/main" id="{5841E0DD-1BA7-47EA-92C1-DFCD469D043C}"/>
+              </a:ext>
+              <a:ext uri="{C183D7F6-B498-43B3-948B-1728B52AA6E4}">
+                <adec:decorative xmlns:adec="http://schemas.microsoft.com/office/drawing/2017/decorative" val="1"/>
+              </a:ext>
+            </a:extLst>
+          </p:cNvPr>
+          <p:cNvSpPr>
+            <a:spLocks noGrp="1" noRot="1" noChangeAspect="1" noMove="1" noResize="1" noEditPoints="1" noAdjustHandles="1" noChangeArrowheads="1" noChangeShapeType="1" noTextEdit="1"/>
+          </p:cNvSpPr>
+          <p:nvPr>
+            <p:extLst>
+              <p:ext uri="{386F3935-93C4-4BCD-93E2-E3B085C9AB24}">
+                <p16:designElem xmlns:p16="http://schemas.microsoft.com/office/powerpoint/2015/main" val="1"/>
+              </p:ext>
+            </p:extLst>
+          </p:nvPr>
+        </p:nvSpPr>
+        <p:spPr>
+          <a:xfrm>
+            <a:off x="155797" y="0"/>
+            <a:ext cx="4195674" cy="2553552"/>
+          </a:xfrm>
+          <a:custGeom>
+            <a:avLst/>
+            <a:gdLst>
+              <a:gd name="connsiteX0" fmla="*/ 51087 w 4195674"/>
+              <a:gd name="connsiteY0" fmla="*/ 0 h 2553552"/>
+              <a:gd name="connsiteX1" fmla="*/ 4144587 w 4195674"/>
+              <a:gd name="connsiteY1" fmla="*/ 0 h 2553552"/>
+              <a:gd name="connsiteX2" fmla="*/ 4153054 w 4195674"/>
+              <a:gd name="connsiteY2" fmla="*/ 32928 h 2553552"/>
+              <a:gd name="connsiteX3" fmla="*/ 4195674 w 4195674"/>
+              <a:gd name="connsiteY3" fmla="*/ 455715 h 2553552"/>
+              <a:gd name="connsiteX4" fmla="*/ 2097837 w 4195674"/>
+              <a:gd name="connsiteY4" fmla="*/ 2553552 h 2553552"/>
+              <a:gd name="connsiteX5" fmla="*/ 0 w 4195674"/>
+              <a:gd name="connsiteY5" fmla="*/ 455715 h 2553552"/>
+              <a:gd name="connsiteX6" fmla="*/ 42621 w 4195674"/>
+              <a:gd name="connsiteY6" fmla="*/ 32928 h 2553552"/>
+            </a:gdLst>
+            <a:ahLst/>
+            <a:cxnLst>
+              <a:cxn ang="0">
+                <a:pos x="connsiteX0" y="connsiteY0"/>
+              </a:cxn>
+              <a:cxn ang="0">
+                <a:pos x="connsiteX1" y="connsiteY1"/>
+              </a:cxn>
+              <a:cxn ang="0">
+                <a:pos x="connsiteX2" y="connsiteY2"/>
+              </a:cxn>
+              <a:cxn ang="0">
+                <a:pos x="connsiteX3" y="connsiteY3"/>
+              </a:cxn>
+              <a:cxn ang="0">
+                <a:pos x="connsiteX4" y="connsiteY4"/>
+              </a:cxn>
+              <a:cxn ang="0">
+                <a:pos x="connsiteX5" y="connsiteY5"/>
+              </a:cxn>
+              <a:cxn ang="0">
+                <a:pos x="connsiteX6" y="connsiteY6"/>
+              </a:cxn>
+            </a:cxnLst>
+            <a:rect l="l" t="t" r="r" b="b"/>
+            <a:pathLst>
+              <a:path w="4195674" h="2553552">
+                <a:moveTo>
+                  <a:pt x="51087" y="0"/>
+                </a:moveTo>
+                <a:lnTo>
+                  <a:pt x="4144587" y="0"/>
+                </a:lnTo>
+                <a:lnTo>
+                  <a:pt x="4153054" y="32928"/>
+                </a:lnTo>
+                <a:cubicBezTo>
+                  <a:pt x="4180999" y="169492"/>
+                  <a:pt x="4195674" y="310890"/>
+                  <a:pt x="4195674" y="455715"/>
+                </a:cubicBezTo>
+                <a:cubicBezTo>
+                  <a:pt x="4195674" y="1614318"/>
+                  <a:pt x="3256440" y="2553552"/>
+                  <a:pt x="2097837" y="2553552"/>
+                </a:cubicBezTo>
+                <a:cubicBezTo>
+                  <a:pt x="939234" y="2553552"/>
+                  <a:pt x="0" y="1614318"/>
+                  <a:pt x="0" y="455715"/>
+                </a:cubicBezTo>
+                <a:cubicBezTo>
+                  <a:pt x="0" y="310890"/>
+                  <a:pt x="14676" y="169492"/>
+                  <a:pt x="42621" y="32928"/>
+                </a:cubicBezTo>
+                <a:close/>
+              </a:path>
+            </a:pathLst>
+          </a:custGeom>
+          <a:gradFill flip="none" rotWithShape="1">
+            <a:gsLst>
+              <a:gs pos="100000">
+                <a:schemeClr val="accent4"/>
+              </a:gs>
+              <a:gs pos="0">
+                <a:schemeClr val="accent2"/>
+              </a:gs>
+            </a:gsLst>
+            <a:lin ang="2700000" scaled="1"/>
+            <a:tileRect/>
+          </a:gradFill>
+          <a:ln>
+            <a:noFill/>
+          </a:ln>
+        </p:spPr>
+        <p:style>
+          <a:lnRef idx="2">
+            <a:schemeClr val="accent1">
+              <a:shade val="50000"/>
+            </a:schemeClr>
+          </a:lnRef>
+          <a:fillRef idx="1">
+            <a:schemeClr val="accent1"/>
+          </a:fillRef>
+          <a:effectRef idx="0">
+            <a:schemeClr val="accent1"/>
+          </a:effectRef>
+          <a:fontRef idx="minor">
+            <a:schemeClr val="lt1"/>
+          </a:fontRef>
+        </p:style>
+        <p:txBody>
+          <a:bodyPr rot="0" spcFirstLastPara="0" vertOverflow="overflow" horzOverflow="overflow" vert="horz" wrap="square" lIns="91440" tIns="45720" rIns="91440" bIns="45720" numCol="1" spcCol="0" rtlCol="0" fromWordArt="0" anchor="ctr" anchorCtr="0" forceAA="0" compatLnSpc="1">
+            <a:prstTxWarp prst="textNoShape">
+              <a:avLst/>
+            </a:prstTxWarp>
+            <a:noAutofit/>
+          </a:bodyPr>
+          <a:lstStyle/>
+          <a:p>
+            <a:pPr algn="ctr"/>
+            <a:endParaRPr lang="en-US"/>
+          </a:p>
+        </p:txBody>
+      </p:sp>
+      <p:pic>
+        <p:nvPicPr>
+          <p:cNvPr id="16" name="Gráfico 15" descr="Banco destaque">
+            <a:extLst>
+              <a:ext uri="{FF2B5EF4-FFF2-40B4-BE49-F238E27FC236}">
+                <a16:creationId xmlns:a16="http://schemas.microsoft.com/office/drawing/2014/main" id="{6A8671AA-18F5-44F7-94B1-52AE8F2025F7}"/>
+              </a:ext>
+            </a:extLst>
+          </p:cNvPr>
+          <p:cNvPicPr>
+            <a:picLocks noChangeAspect="1"/>
+          </p:cNvPicPr>
+          <p:nvPr/>
+        </p:nvPicPr>
+        <p:blipFill>
+          <a:blip r:embed="rId2">
+            <a:extLst>
+              <a:ext uri="{28A0092B-C50C-407E-A947-70E740481C1C}">
+                <a14:useLocalDpi xmlns:a14="http://schemas.microsoft.com/office/drawing/2010/main" val="0"/>
+              </a:ext>
+              <a:ext uri="{96DAC541-7B7A-43D3-8B79-37D633B846F1}">
+                <asvg:svgBlip xmlns:asvg="http://schemas.microsoft.com/office/drawing/2016/SVG/main" r:embed="rId3"/>
+              </a:ext>
+            </a:extLst>
+          </a:blip>
+          <a:stretch>
+            <a:fillRect/>
+          </a:stretch>
+        </p:blipFill>
+        <p:spPr>
+          <a:xfrm>
+            <a:off x="1202854" y="136525"/>
+            <a:ext cx="1935439" cy="1935439"/>
+          </a:xfrm>
+          <a:prstGeom prst="rect">
+            <a:avLst/>
+          </a:prstGeom>
+        </p:spPr>
+      </p:pic>
+      <p:sp>
+        <p:nvSpPr>
+          <p:cNvPr id="59" name="Graphic 11">
+            <a:extLst>
+              <a:ext uri="{FF2B5EF4-FFF2-40B4-BE49-F238E27FC236}">
+                <a16:creationId xmlns:a16="http://schemas.microsoft.com/office/drawing/2014/main" id="{6CB927A4-E432-4310-9CD5-E89FF5063179}"/>
+              </a:ext>
+              <a:ext uri="{C183D7F6-B498-43B3-948B-1728B52AA6E4}">
+                <adec:decorative xmlns:adec="http://schemas.microsoft.com/office/drawing/2017/decorative" val="1"/>
+              </a:ext>
+            </a:extLst>
+          </p:cNvPr>
+          <p:cNvSpPr>
+            <a:spLocks noGrp="1" noRot="1" noChangeAspect="1" noMove="1" noResize="1" noEditPoints="1" noAdjustHandles="1" noChangeArrowheads="1" noChangeShapeType="1" noTextEdit="1"/>
+          </p:cNvSpPr>
+          <p:nvPr>
+            <p:extLst>
+              <p:ext uri="{386F3935-93C4-4BCD-93E2-E3B085C9AB24}">
+                <p16:designElem xmlns:p16="http://schemas.microsoft.com/office/powerpoint/2015/main" val="1"/>
+              </p:ext>
+            </p:extLst>
+          </p:nvPr>
+        </p:nvSpPr>
+        <p:spPr>
+          <a:xfrm>
+            <a:off x="4657148" y="987117"/>
+            <a:ext cx="171515" cy="171515"/>
+          </a:xfrm>
+          <a:custGeom>
+            <a:avLst/>
+            <a:gdLst>
+              <a:gd name="connsiteX0" fmla="*/ 159874 w 171515"/>
+              <a:gd name="connsiteY0" fmla="*/ 74116 h 171515"/>
+              <a:gd name="connsiteX1" fmla="*/ 97399 w 171515"/>
+              <a:gd name="connsiteY1" fmla="*/ 74116 h 171515"/>
+              <a:gd name="connsiteX2" fmla="*/ 97399 w 171515"/>
+              <a:gd name="connsiteY2" fmla="*/ 11641 h 171515"/>
+              <a:gd name="connsiteX3" fmla="*/ 85758 w 171515"/>
+              <a:gd name="connsiteY3" fmla="*/ 0 h 171515"/>
+              <a:gd name="connsiteX4" fmla="*/ 74116 w 171515"/>
+              <a:gd name="connsiteY4" fmla="*/ 11641 h 171515"/>
+              <a:gd name="connsiteX5" fmla="*/ 74116 w 171515"/>
+              <a:gd name="connsiteY5" fmla="*/ 74116 h 171515"/>
+              <a:gd name="connsiteX6" fmla="*/ 11641 w 171515"/>
+              <a:gd name="connsiteY6" fmla="*/ 74116 h 171515"/>
+              <a:gd name="connsiteX7" fmla="*/ 0 w 171515"/>
+              <a:gd name="connsiteY7" fmla="*/ 85758 h 171515"/>
+              <a:gd name="connsiteX8" fmla="*/ 11641 w 171515"/>
+              <a:gd name="connsiteY8" fmla="*/ 97399 h 171515"/>
+              <a:gd name="connsiteX9" fmla="*/ 74116 w 171515"/>
+              <a:gd name="connsiteY9" fmla="*/ 97399 h 171515"/>
+              <a:gd name="connsiteX10" fmla="*/ 74116 w 171515"/>
+              <a:gd name="connsiteY10" fmla="*/ 159874 h 171515"/>
+              <a:gd name="connsiteX11" fmla="*/ 85758 w 171515"/>
+              <a:gd name="connsiteY11" fmla="*/ 171515 h 171515"/>
+              <a:gd name="connsiteX12" fmla="*/ 97399 w 171515"/>
+              <a:gd name="connsiteY12" fmla="*/ 159874 h 171515"/>
+              <a:gd name="connsiteX13" fmla="*/ 97399 w 171515"/>
+              <a:gd name="connsiteY13" fmla="*/ 97399 h 171515"/>
+              <a:gd name="connsiteX14" fmla="*/ 159874 w 171515"/>
+              <a:gd name="connsiteY14" fmla="*/ 97399 h 171515"/>
+              <a:gd name="connsiteX15" fmla="*/ 171515 w 171515"/>
+              <a:gd name="connsiteY15" fmla="*/ 85758 h 171515"/>
+              <a:gd name="connsiteX16" fmla="*/ 159874 w 171515"/>
+              <a:gd name="connsiteY16" fmla="*/ 74116 h 171515"/>
+            </a:gdLst>
+            <a:ahLst/>
+            <a:cxnLst>
+              <a:cxn ang="0">
+                <a:pos x="connsiteX0" y="connsiteY0"/>
+              </a:cxn>
+              <a:cxn ang="0">
+                <a:pos x="connsiteX1" y="connsiteY1"/>
+              </a:cxn>
+              <a:cxn ang="0">
+                <a:pos x="connsiteX2" y="connsiteY2"/>
+              </a:cxn>
+              <a:cxn ang="0">
+                <a:pos x="connsiteX3" y="connsiteY3"/>
+              </a:cxn>
+              <a:cxn ang="0">
+                <a:pos x="connsiteX4" y="connsiteY4"/>
+              </a:cxn>
+              <a:cxn ang="0">
+                <a:pos x="connsiteX5" y="connsiteY5"/>
+              </a:cxn>
+              <a:cxn ang="0">
+                <a:pos x="connsiteX6" y="connsiteY6"/>
+              </a:cxn>
+              <a:cxn ang="0">
+                <a:pos x="connsiteX7" y="connsiteY7"/>
+              </a:cxn>
+              <a:cxn ang="0">
+                <a:pos x="connsiteX8" y="connsiteY8"/>
+              </a:cxn>
+              <a:cxn ang="0">
+                <a:pos x="connsiteX9" y="connsiteY9"/>
+              </a:cxn>
+              <a:cxn ang="0">
+                <a:pos x="connsiteX10" y="connsiteY10"/>
+              </a:cxn>
+              <a:cxn ang="0">
+                <a:pos x="connsiteX11" y="connsiteY11"/>
+              </a:cxn>
+              <a:cxn ang="0">
+                <a:pos x="connsiteX12" y="connsiteY12"/>
+              </a:cxn>
+              <a:cxn ang="0">
+                <a:pos x="connsiteX13" y="connsiteY13"/>
+              </a:cxn>
+              <a:cxn ang="0">
+                <a:pos x="connsiteX14" y="connsiteY14"/>
+              </a:cxn>
+              <a:cxn ang="0">
+                <a:pos x="connsiteX15" y="connsiteY15"/>
+              </a:cxn>
+              <a:cxn ang="0">
+                <a:pos x="connsiteX16" y="connsiteY16"/>
+              </a:cxn>
+            </a:cxnLst>
+            <a:rect l="l" t="t" r="r" b="b"/>
+            <a:pathLst>
+              <a:path w="171515" h="171515">
+                <a:moveTo>
+                  <a:pt x="159874" y="74116"/>
+                </a:moveTo>
+                <a:lnTo>
+                  <a:pt x="97399" y="74116"/>
+                </a:lnTo>
+                <a:lnTo>
+                  <a:pt x="97399" y="11641"/>
+                </a:lnTo>
+                <a:cubicBezTo>
+                  <a:pt x="97399" y="5212"/>
+                  <a:pt x="92187" y="0"/>
+                  <a:pt x="85758" y="0"/>
+                </a:cubicBezTo>
+                <a:cubicBezTo>
+                  <a:pt x="79328" y="0"/>
+                  <a:pt x="74116" y="5212"/>
+                  <a:pt x="74116" y="11641"/>
+                </a:cubicBezTo>
+                <a:lnTo>
+                  <a:pt x="74116" y="74116"/>
+                </a:lnTo>
+                <a:lnTo>
+                  <a:pt x="11641" y="74116"/>
+                </a:lnTo>
+                <a:cubicBezTo>
+                  <a:pt x="5212" y="74116"/>
+                  <a:pt x="0" y="79328"/>
+                  <a:pt x="0" y="85758"/>
+                </a:cubicBezTo>
+                <a:cubicBezTo>
+                  <a:pt x="0" y="92187"/>
+                  <a:pt x="5212" y="97399"/>
+                  <a:pt x="11641" y="97399"/>
+                </a:cubicBezTo>
+                <a:lnTo>
+                  <a:pt x="74116" y="97399"/>
+                </a:lnTo>
+                <a:lnTo>
+                  <a:pt x="74116" y="159874"/>
+                </a:lnTo>
+                <a:cubicBezTo>
+                  <a:pt x="74116" y="166303"/>
+                  <a:pt x="79328" y="171515"/>
+                  <a:pt x="85758" y="171515"/>
+                </a:cubicBezTo>
+                <a:cubicBezTo>
+                  <a:pt x="92187" y="171515"/>
+                  <a:pt x="97399" y="166303"/>
+                  <a:pt x="97399" y="159874"/>
+                </a:cubicBezTo>
+                <a:lnTo>
+                  <a:pt x="97399" y="97399"/>
+                </a:lnTo>
+                <a:lnTo>
+                  <a:pt x="159874" y="97399"/>
+                </a:lnTo>
+                <a:cubicBezTo>
+                  <a:pt x="166303" y="97399"/>
+                  <a:pt x="171515" y="92187"/>
+                  <a:pt x="171515" y="85758"/>
+                </a:cubicBezTo>
+                <a:cubicBezTo>
+                  <a:pt x="171515" y="79328"/>
+                  <a:pt x="166303" y="74116"/>
+                  <a:pt x="159874" y="74116"/>
+                </a:cubicBezTo>
+                <a:close/>
+              </a:path>
+            </a:pathLst>
+          </a:custGeom>
+          <a:solidFill>
+            <a:schemeClr val="accent2"/>
+          </a:solidFill>
+          <a:ln w="776" cap="flat">
+            <a:noFill/>
+            <a:prstDash val="solid"/>
+            <a:miter/>
+          </a:ln>
+        </p:spPr>
+        <p:txBody>
+          <a:bodyPr rtlCol="0" anchor="ctr"/>
+          <a:lstStyle/>
+          <a:p>
+            <a:endParaRPr lang="en-US"/>
+          </a:p>
+        </p:txBody>
+      </p:sp>
+      <p:sp>
+        <p:nvSpPr>
+          <p:cNvPr id="61" name="Freeform: Shape 60">
+            <a:extLst>
+              <a:ext uri="{FF2B5EF4-FFF2-40B4-BE49-F238E27FC236}">
+                <a16:creationId xmlns:a16="http://schemas.microsoft.com/office/drawing/2014/main" id="{8D3BEFDA-0C8B-4C24-AF49-B7E58C98DB64}"/>
+              </a:ext>
+              <a:ext uri="{C183D7F6-B498-43B3-948B-1728B52AA6E4}">
+                <adec:decorative xmlns:adec="http://schemas.microsoft.com/office/drawing/2017/decorative" val="1"/>
+              </a:ext>
+            </a:extLst>
+          </p:cNvPr>
+          <p:cNvSpPr>
+            <a:spLocks noGrp="1" noRot="1" noChangeAspect="1" noMove="1" noResize="1" noEditPoints="1" noAdjustHandles="1" noChangeArrowheads="1" noChangeShapeType="1" noTextEdit="1"/>
+          </p:cNvSpPr>
+          <p:nvPr>
+            <p:extLst>
+              <p:ext uri="{386F3935-93C4-4BCD-93E2-E3B085C9AB24}">
+                <p16:designElem xmlns:p16="http://schemas.microsoft.com/office/powerpoint/2015/main" val="1"/>
+              </p:ext>
+            </p:extLst>
+          </p:nvPr>
+        </p:nvSpPr>
+        <p:spPr>
+          <a:xfrm>
+            <a:off x="0" y="2756811"/>
+            <a:ext cx="4507268" cy="4101189"/>
+          </a:xfrm>
+          <a:custGeom>
+            <a:avLst/>
+            <a:gdLst>
+              <a:gd name="connsiteX0" fmla="*/ 1188901 w 4507268"/>
+              <a:gd name="connsiteY0" fmla="*/ 0 h 4101189"/>
+              <a:gd name="connsiteX1" fmla="*/ 4507268 w 4507268"/>
+              <a:gd name="connsiteY1" fmla="*/ 3318367 h 4101189"/>
+              <a:gd name="connsiteX2" fmla="*/ 4439851 w 4507268"/>
+              <a:gd name="connsiteY2" fmla="*/ 3987135 h 4101189"/>
+              <a:gd name="connsiteX3" fmla="*/ 4410525 w 4507268"/>
+              <a:gd name="connsiteY3" fmla="*/ 4101189 h 4101189"/>
+              <a:gd name="connsiteX4" fmla="*/ 0 w 4507268"/>
+              <a:gd name="connsiteY4" fmla="*/ 4101189 h 4101189"/>
+              <a:gd name="connsiteX5" fmla="*/ 0 w 4507268"/>
+              <a:gd name="connsiteY5" fmla="*/ 221283 h 4101189"/>
+              <a:gd name="connsiteX6" fmla="*/ 47936 w 4507268"/>
+              <a:gd name="connsiteY6" fmla="*/ 201358 h 4101189"/>
+              <a:gd name="connsiteX7" fmla="*/ 1188901 w 4507268"/>
+              <a:gd name="connsiteY7" fmla="*/ 0 h 4101189"/>
+            </a:gdLst>
+            <a:ahLst/>
+            <a:cxnLst>
+              <a:cxn ang="0">
+                <a:pos x="connsiteX0" y="connsiteY0"/>
+              </a:cxn>
+              <a:cxn ang="0">
+                <a:pos x="connsiteX1" y="connsiteY1"/>
+              </a:cxn>
+              <a:cxn ang="0">
+                <a:pos x="connsiteX2" y="connsiteY2"/>
+              </a:cxn>
+              <a:cxn ang="0">
+                <a:pos x="connsiteX3" y="connsiteY3"/>
+              </a:cxn>
+              <a:cxn ang="0">
+                <a:pos x="connsiteX4" y="connsiteY4"/>
+              </a:cxn>
+              <a:cxn ang="0">
+                <a:pos x="connsiteX5" y="connsiteY5"/>
+              </a:cxn>
+              <a:cxn ang="0">
+                <a:pos x="connsiteX6" y="connsiteY6"/>
+              </a:cxn>
+              <a:cxn ang="0">
+                <a:pos x="connsiteX7" y="connsiteY7"/>
+              </a:cxn>
+            </a:cxnLst>
+            <a:rect l="l" t="t" r="r" b="b"/>
+            <a:pathLst>
+              <a:path w="4507268" h="4101189">
+                <a:moveTo>
+                  <a:pt x="1188901" y="0"/>
+                </a:moveTo>
+                <a:cubicBezTo>
+                  <a:pt x="3021585" y="0"/>
+                  <a:pt x="4507268" y="1485684"/>
+                  <a:pt x="4507268" y="3318367"/>
+                </a:cubicBezTo>
+                <a:cubicBezTo>
+                  <a:pt x="4507268" y="3547453"/>
+                  <a:pt x="4484055" y="3771117"/>
+                  <a:pt x="4439851" y="3987135"/>
+                </a:cubicBezTo>
+                <a:lnTo>
+                  <a:pt x="4410525" y="4101189"/>
+                </a:lnTo>
+                <a:lnTo>
+                  <a:pt x="0" y="4101189"/>
+                </a:lnTo>
+                <a:lnTo>
+                  <a:pt x="0" y="221283"/>
+                </a:lnTo>
+                <a:lnTo>
+                  <a:pt x="47936" y="201358"/>
+                </a:lnTo>
+                <a:cubicBezTo>
+                  <a:pt x="403707" y="71093"/>
+                  <a:pt x="788002" y="0"/>
+                  <a:pt x="1188901" y="0"/>
+                </a:cubicBezTo>
+                <a:close/>
+              </a:path>
+            </a:pathLst>
+          </a:custGeom>
+          <a:gradFill flip="none" rotWithShape="1">
+            <a:gsLst>
+              <a:gs pos="100000">
+                <a:schemeClr val="accent4"/>
+              </a:gs>
+              <a:gs pos="0">
+                <a:schemeClr val="accent2"/>
+              </a:gs>
+            </a:gsLst>
+            <a:lin ang="2700000" scaled="1"/>
+            <a:tileRect/>
+          </a:gradFill>
+          <a:ln>
+            <a:noFill/>
+          </a:ln>
+        </p:spPr>
+        <p:style>
+          <a:lnRef idx="2">
+            <a:schemeClr val="accent1">
+              <a:shade val="50000"/>
+            </a:schemeClr>
+          </a:lnRef>
+          <a:fillRef idx="1">
+            <a:schemeClr val="accent1"/>
+          </a:fillRef>
+          <a:effectRef idx="0">
+            <a:schemeClr val="accent1"/>
+          </a:effectRef>
+          <a:fontRef idx="minor">
+            <a:schemeClr val="lt1"/>
+          </a:fontRef>
+        </p:style>
+        <p:txBody>
+          <a:bodyPr rot="0" spcFirstLastPara="0" vertOverflow="overflow" horzOverflow="overflow" vert="horz" wrap="square" lIns="91440" tIns="45720" rIns="91440" bIns="45720" numCol="1" spcCol="0" rtlCol="0" fromWordArt="0" anchor="ctr" anchorCtr="0" forceAA="0" compatLnSpc="1">
+            <a:prstTxWarp prst="textNoShape">
+              <a:avLst/>
+            </a:prstTxWarp>
+            <a:noAutofit/>
+          </a:bodyPr>
+          <a:lstStyle/>
+          <a:p>
+            <a:pPr algn="ctr"/>
+            <a:endParaRPr lang="en-US"/>
+          </a:p>
+        </p:txBody>
+      </p:sp>
+      <p:sp>
+        <p:nvSpPr>
+          <p:cNvPr id="63" name="Oval 62">
+            <a:extLst>
+              <a:ext uri="{FF2B5EF4-FFF2-40B4-BE49-F238E27FC236}">
+                <a16:creationId xmlns:a16="http://schemas.microsoft.com/office/drawing/2014/main" id="{7400EEA6-B330-4DBC-A821-469627E96203}"/>
+              </a:ext>
+              <a:ext uri="{C183D7F6-B498-43B3-948B-1728B52AA6E4}">
+                <adec:decorative xmlns:adec="http://schemas.microsoft.com/office/drawing/2017/decorative" val="1"/>
+              </a:ext>
+            </a:extLst>
+          </p:cNvPr>
+          <p:cNvSpPr>
+            <a:spLocks noGrp="1" noRot="1" noChangeAspect="1" noMove="1" noResize="1" noEditPoints="1" noAdjustHandles="1" noChangeArrowheads="1" noChangeShapeType="1" noTextEdit="1"/>
+          </p:cNvSpPr>
+          <p:nvPr>
+            <p:extLst>
+              <p:ext uri="{386F3935-93C4-4BCD-93E2-E3B085C9AB24}">
+                <p16:designElem xmlns:p16="http://schemas.microsoft.com/office/powerpoint/2015/main" val="1"/>
+              </p:ext>
+            </p:extLst>
+          </p:nvPr>
+        </p:nvSpPr>
+        <p:spPr>
+          <a:xfrm>
+            <a:off x="3840123" y="1601385"/>
+            <a:ext cx="2754831" cy="2754831"/>
+          </a:xfrm>
+          <a:prstGeom prst="ellipse">
+            <a:avLst/>
+          </a:prstGeom>
+          <a:gradFill flip="none" rotWithShape="1">
+            <a:gsLst>
+              <a:gs pos="100000">
+                <a:schemeClr val="accent4"/>
+              </a:gs>
+              <a:gs pos="0">
+                <a:schemeClr val="accent2"/>
+              </a:gs>
+            </a:gsLst>
+            <a:lin ang="2700000" scaled="1"/>
+            <a:tileRect/>
+          </a:gradFill>
+          <a:ln>
+            <a:noFill/>
+          </a:ln>
+        </p:spPr>
+        <p:style>
+          <a:lnRef idx="2">
+            <a:schemeClr val="accent1">
+              <a:shade val="50000"/>
+            </a:schemeClr>
+          </a:lnRef>
+          <a:fillRef idx="1">
+            <a:schemeClr val="accent1"/>
+          </a:fillRef>
+          <a:effectRef idx="0">
+            <a:schemeClr val="accent1"/>
+          </a:effectRef>
+          <a:fontRef idx="minor">
+            <a:schemeClr val="lt1"/>
+          </a:fontRef>
+        </p:style>
+        <p:txBody>
+          <a:bodyPr rot="0" spcFirstLastPara="0" vertOverflow="overflow" horzOverflow="overflow" vert="horz" wrap="square" lIns="91440" tIns="45720" rIns="91440" bIns="45720" numCol="1" spcCol="0" rtlCol="0" fromWordArt="0" anchor="ctr" anchorCtr="0" forceAA="0" compatLnSpc="1">
+            <a:prstTxWarp prst="textNoShape">
+              <a:avLst/>
+            </a:prstTxWarp>
+            <a:noAutofit/>
+          </a:bodyPr>
+          <a:lstStyle/>
+          <a:p>
+            <a:pPr algn="ctr"/>
+            <a:endParaRPr lang="en-US"/>
+          </a:p>
+        </p:txBody>
+      </p:sp>
+      <p:sp>
+        <p:nvSpPr>
+          <p:cNvPr id="10" name="Marcador de Posição de Conteúdo 9">
+            <a:extLst>
+              <a:ext uri="{FF2B5EF4-FFF2-40B4-BE49-F238E27FC236}">
+                <a16:creationId xmlns:a16="http://schemas.microsoft.com/office/drawing/2014/main" id="{11E5765F-7BCF-A33E-C17E-B683EDCA27A5}"/>
+              </a:ext>
+            </a:extLst>
+          </p:cNvPr>
+          <p:cNvSpPr>
+            <a:spLocks noGrp="1"/>
+          </p:cNvSpPr>
+          <p:nvPr>
+            <p:ph idx="1"/>
+          </p:nvPr>
+        </p:nvSpPr>
+        <p:spPr>
+          <a:xfrm>
+            <a:off x="6977031" y="2990818"/>
+            <a:ext cx="3876357" cy="2913872"/>
+          </a:xfrm>
+        </p:spPr>
+        <p:txBody>
+          <a:bodyPr vert="horz" lIns="91440" tIns="45720" rIns="91440" bIns="45720" rtlCol="0" anchor="t">
+            <a:normAutofit/>
+          </a:bodyPr>
+          <a:lstStyle/>
+          <a:p>
+            <a:r>
+              <a:rPr lang="en-US" sz="1800" dirty="0"/>
+              <a:t>With considerably fewer entries, the dataset is also composed of the </a:t>
+            </a:r>
+            <a:r>
+              <a:rPr lang="en-US" sz="1800" b="1" dirty="0"/>
+              <a:t>businesses</a:t>
+            </a:r>
+            <a:r>
+              <a:rPr lang="en-US" sz="1800" dirty="0"/>
+              <a:t> for which the reviews are made, as well as </a:t>
+            </a:r>
+            <a:r>
+              <a:rPr lang="en-US" sz="1800" b="1" dirty="0"/>
+              <a:t>tips</a:t>
+            </a:r>
+            <a:r>
+              <a:rPr lang="en-US" sz="1800" dirty="0"/>
+              <a:t>, that are like smaller review and check-ins, which represents a physical entrance into the business by a </a:t>
+            </a:r>
+            <a:r>
+              <a:rPr lang="en-US" sz="1800" b="1" dirty="0"/>
+              <a:t>user</a:t>
+            </a:r>
+            <a:r>
+              <a:rPr lang="en-US" sz="1800" dirty="0"/>
+              <a:t>.</a:t>
+            </a:r>
+          </a:p>
+          <a:p>
+            <a:endParaRPr lang="en-US" sz="1800" dirty="0"/>
+          </a:p>
+        </p:txBody>
+      </p:sp>
+      <p:pic>
+        <p:nvPicPr>
+          <p:cNvPr id="6" name="Gráfico 5" descr="Comentário: gostar com preenchimento sólido">
+            <a:extLst>
+              <a:ext uri="{FF2B5EF4-FFF2-40B4-BE49-F238E27FC236}">
+                <a16:creationId xmlns:a16="http://schemas.microsoft.com/office/drawing/2014/main" id="{75FFCF93-B22E-7A76-8163-FE0B6469B323}"/>
+              </a:ext>
+            </a:extLst>
+          </p:cNvPr>
+          <p:cNvPicPr>
+            <a:picLocks noChangeAspect="1"/>
+          </p:cNvPicPr>
+          <p:nvPr/>
+        </p:nvPicPr>
+        <p:blipFill>
+          <a:blip r:embed="rId4">
+            <a:extLst>
+              <a:ext uri="{28A0092B-C50C-407E-A947-70E740481C1C}">
+                <a14:useLocalDpi xmlns:a14="http://schemas.microsoft.com/office/drawing/2010/main" val="0"/>
+              </a:ext>
+              <a:ext uri="{96DAC541-7B7A-43D3-8B79-37D633B846F1}">
+                <asvg:svgBlip xmlns:asvg="http://schemas.microsoft.com/office/drawing/2016/SVG/main" r:embed="rId5"/>
+              </a:ext>
+            </a:extLst>
+          </a:blip>
+          <a:stretch>
+            <a:fillRect/>
+          </a:stretch>
+        </p:blipFill>
+        <p:spPr>
+          <a:xfrm>
+            <a:off x="187880" y="3610394"/>
+            <a:ext cx="2983972" cy="2983972"/>
+          </a:xfrm>
+          <a:prstGeom prst="rect">
+            <a:avLst/>
+          </a:prstGeom>
+        </p:spPr>
+      </p:pic>
+      <p:pic>
+        <p:nvPicPr>
+          <p:cNvPr id="14" name="Gráfico 13" descr="Divisas com preenchimento sólido">
+            <a:extLst>
+              <a:ext uri="{FF2B5EF4-FFF2-40B4-BE49-F238E27FC236}">
+                <a16:creationId xmlns:a16="http://schemas.microsoft.com/office/drawing/2014/main" id="{91CCF63E-454F-7279-BC88-0E2649C7871A}"/>
+              </a:ext>
+            </a:extLst>
+          </p:cNvPr>
+          <p:cNvPicPr>
+            <a:picLocks noChangeAspect="1"/>
+          </p:cNvPicPr>
+          <p:nvPr/>
+        </p:nvPicPr>
+        <p:blipFill>
+          <a:blip r:embed="rId6">
+            <a:extLst>
+              <a:ext uri="{28A0092B-C50C-407E-A947-70E740481C1C}">
+                <a14:useLocalDpi xmlns:a14="http://schemas.microsoft.com/office/drawing/2010/main" val="0"/>
+              </a:ext>
+              <a:ext uri="{96DAC541-7B7A-43D3-8B79-37D633B846F1}">
+                <asvg:svgBlip xmlns:asvg="http://schemas.microsoft.com/office/drawing/2016/SVG/main" r:embed="rId7"/>
+              </a:ext>
+            </a:extLst>
+          </a:blip>
+          <a:stretch>
+            <a:fillRect/>
+          </a:stretch>
+        </p:blipFill>
+        <p:spPr>
+          <a:xfrm>
+            <a:off x="4368633" y="2129895"/>
+            <a:ext cx="1697810" cy="1697810"/>
+          </a:xfrm>
+          <a:prstGeom prst="rect">
+            <a:avLst/>
+          </a:prstGeom>
+        </p:spPr>
+      </p:pic>
+      <p:sp>
+        <p:nvSpPr>
+          <p:cNvPr id="65" name="Graphic 12">
+            <a:extLst>
+              <a:ext uri="{FF2B5EF4-FFF2-40B4-BE49-F238E27FC236}">
+                <a16:creationId xmlns:a16="http://schemas.microsoft.com/office/drawing/2014/main" id="{1453BF6C-B012-48B7-B4E8-6D7AC7C27D02}"/>
+              </a:ext>
+              <a:ext uri="{C183D7F6-B498-43B3-948B-1728B52AA6E4}">
+                <adec:decorative xmlns:adec="http://schemas.microsoft.com/office/drawing/2017/decorative" val="1"/>
+              </a:ext>
+            </a:extLst>
+          </p:cNvPr>
+          <p:cNvSpPr>
+            <a:spLocks noGrp="1" noRot="1" noChangeAspect="1" noMove="1" noResize="1" noEditPoints="1" noAdjustHandles="1" noChangeArrowheads="1" noChangeShapeType="1" noTextEdit="1"/>
+          </p:cNvSpPr>
+          <p:nvPr>
+            <p:extLst>
+              <p:ext uri="{386F3935-93C4-4BCD-93E2-E3B085C9AB24}">
+                <p16:designElem xmlns:p16="http://schemas.microsoft.com/office/powerpoint/2015/main" val="1"/>
+              </p:ext>
+            </p:extLst>
+          </p:nvPr>
+        </p:nvSpPr>
+        <p:spPr>
+          <a:xfrm>
+            <a:off x="5697278" y="4908805"/>
+            <a:ext cx="157545" cy="157545"/>
+          </a:xfrm>
+          <a:custGeom>
+            <a:avLst/>
+            <a:gdLst>
+              <a:gd name="connsiteX0" fmla="*/ 78773 w 157545"/>
+              <a:gd name="connsiteY0" fmla="*/ 23283 h 157545"/>
+              <a:gd name="connsiteX1" fmla="*/ 134262 w 157545"/>
+              <a:gd name="connsiteY1" fmla="*/ 78773 h 157545"/>
+              <a:gd name="connsiteX2" fmla="*/ 78773 w 157545"/>
+              <a:gd name="connsiteY2" fmla="*/ 134262 h 157545"/>
+              <a:gd name="connsiteX3" fmla="*/ 23283 w 157545"/>
+              <a:gd name="connsiteY3" fmla="*/ 78773 h 157545"/>
+              <a:gd name="connsiteX4" fmla="*/ 78773 w 157545"/>
+              <a:gd name="connsiteY4" fmla="*/ 23283 h 157545"/>
+              <a:gd name="connsiteX5" fmla="*/ 78773 w 157545"/>
+              <a:gd name="connsiteY5" fmla="*/ 0 h 157545"/>
+              <a:gd name="connsiteX6" fmla="*/ 0 w 157545"/>
+              <a:gd name="connsiteY6" fmla="*/ 78773 h 157545"/>
+              <a:gd name="connsiteX7" fmla="*/ 78773 w 157545"/>
+              <a:gd name="connsiteY7" fmla="*/ 157545 h 157545"/>
+              <a:gd name="connsiteX8" fmla="*/ 157545 w 157545"/>
+              <a:gd name="connsiteY8" fmla="*/ 78773 h 157545"/>
+              <a:gd name="connsiteX9" fmla="*/ 78773 w 157545"/>
+              <a:gd name="connsiteY9" fmla="*/ 0 h 157545"/>
+            </a:gdLst>
+            <a:ahLst/>
+            <a:cxnLst>
+              <a:cxn ang="0">
+                <a:pos x="connsiteX0" y="connsiteY0"/>
+              </a:cxn>
+              <a:cxn ang="0">
+                <a:pos x="connsiteX1" y="connsiteY1"/>
+              </a:cxn>
+              <a:cxn ang="0">
+                <a:pos x="connsiteX2" y="connsiteY2"/>
+              </a:cxn>
+              <a:cxn ang="0">
+                <a:pos x="connsiteX3" y="connsiteY3"/>
+              </a:cxn>
+              <a:cxn ang="0">
+                <a:pos x="connsiteX4" y="connsiteY4"/>
+              </a:cxn>
+              <a:cxn ang="0">
+                <a:pos x="connsiteX5" y="connsiteY5"/>
+              </a:cxn>
+              <a:cxn ang="0">
+                <a:pos x="connsiteX6" y="connsiteY6"/>
+              </a:cxn>
+              <a:cxn ang="0">
+                <a:pos x="connsiteX7" y="connsiteY7"/>
+              </a:cxn>
+              <a:cxn ang="0">
+                <a:pos x="connsiteX8" y="connsiteY8"/>
+              </a:cxn>
+              <a:cxn ang="0">
+                <a:pos x="connsiteX9" y="connsiteY9"/>
+              </a:cxn>
+            </a:cxnLst>
+            <a:rect l="l" t="t" r="r" b="b"/>
+            <a:pathLst>
+              <a:path w="157545" h="157545">
+                <a:moveTo>
+                  <a:pt x="78773" y="23283"/>
+                </a:moveTo>
+                <a:cubicBezTo>
+                  <a:pt x="109419" y="23283"/>
+                  <a:pt x="134262" y="48126"/>
+                  <a:pt x="134262" y="78773"/>
+                </a:cubicBezTo>
+                <a:cubicBezTo>
+                  <a:pt x="134262" y="109419"/>
+                  <a:pt x="109419" y="134262"/>
+                  <a:pt x="78773" y="134262"/>
+                </a:cubicBezTo>
+                <a:cubicBezTo>
+                  <a:pt x="48126" y="134262"/>
+                  <a:pt x="23283" y="109419"/>
+                  <a:pt x="23283" y="78773"/>
+                </a:cubicBezTo>
+                <a:cubicBezTo>
+                  <a:pt x="23312" y="48139"/>
+                  <a:pt x="48139" y="23312"/>
+                  <a:pt x="78773" y="23283"/>
+                </a:cubicBezTo>
+                <a:moveTo>
+                  <a:pt x="78773" y="0"/>
+                </a:moveTo>
+                <a:cubicBezTo>
+                  <a:pt x="35268" y="0"/>
+                  <a:pt x="0" y="35268"/>
+                  <a:pt x="0" y="78773"/>
+                </a:cubicBezTo>
+                <a:cubicBezTo>
+                  <a:pt x="0" y="122277"/>
+                  <a:pt x="35268" y="157545"/>
+                  <a:pt x="78773" y="157545"/>
+                </a:cubicBezTo>
+                <a:cubicBezTo>
+                  <a:pt x="122277" y="157545"/>
+                  <a:pt x="157545" y="122277"/>
+                  <a:pt x="157545" y="78773"/>
+                </a:cubicBezTo>
+                <a:cubicBezTo>
+                  <a:pt x="157545" y="35268"/>
+                  <a:pt x="122277" y="0"/>
+                  <a:pt x="78773" y="0"/>
+                </a:cubicBezTo>
+                <a:close/>
+              </a:path>
+            </a:pathLst>
+          </a:custGeom>
+          <a:solidFill>
+            <a:schemeClr val="accent2"/>
+          </a:solidFill>
+          <a:ln w="751" cap="flat">
+            <a:noFill/>
+            <a:prstDash val="solid"/>
+            <a:miter/>
+          </a:ln>
+        </p:spPr>
+        <p:txBody>
+          <a:bodyPr rtlCol="0" anchor="ctr"/>
+          <a:lstStyle/>
+          <a:p>
+            <a:endParaRPr lang="en-US"/>
+          </a:p>
+        </p:txBody>
+      </p:sp>
+      <p:sp>
+        <p:nvSpPr>
+          <p:cNvPr id="67" name="Graphic 10">
+            <a:extLst>
+              <a:ext uri="{FF2B5EF4-FFF2-40B4-BE49-F238E27FC236}">
+                <a16:creationId xmlns:a16="http://schemas.microsoft.com/office/drawing/2014/main" id="{E3020543-B24B-4EC4-8FFC-8DD88EEA91A8}"/>
+              </a:ext>
+              <a:ext uri="{C183D7F6-B498-43B3-948B-1728B52AA6E4}">
+                <adec:decorative xmlns:adec="http://schemas.microsoft.com/office/drawing/2017/decorative" val="1"/>
+              </a:ext>
+            </a:extLst>
+          </p:cNvPr>
+          <p:cNvSpPr>
+            <a:spLocks noGrp="1" noRot="1" noChangeAspect="1" noMove="1" noResize="1" noEditPoints="1" noAdjustHandles="1" noChangeArrowheads="1" noChangeShapeType="1" noTextEdit="1"/>
+          </p:cNvSpPr>
+          <p:nvPr>
+            <p:extLst>
+              <p:ext uri="{386F3935-93C4-4BCD-93E2-E3B085C9AB24}">
+                <p16:designElem xmlns:p16="http://schemas.microsoft.com/office/powerpoint/2015/main" val="1"/>
+              </p:ext>
+            </p:extLst>
+          </p:nvPr>
+        </p:nvSpPr>
+        <p:spPr>
+          <a:xfrm>
+            <a:off x="5454151" y="5775084"/>
+            <a:ext cx="112426" cy="112426"/>
+          </a:xfrm>
+          <a:custGeom>
+            <a:avLst/>
+            <a:gdLst>
+              <a:gd name="connsiteX0" fmla="*/ 112426 w 112426"/>
+              <a:gd name="connsiteY0" fmla="*/ 56213 h 112426"/>
+              <a:gd name="connsiteX1" fmla="*/ 56213 w 112426"/>
+              <a:gd name="connsiteY1" fmla="*/ 112426 h 112426"/>
+              <a:gd name="connsiteX2" fmla="*/ 0 w 112426"/>
+              <a:gd name="connsiteY2" fmla="*/ 56213 h 112426"/>
+              <a:gd name="connsiteX3" fmla="*/ 56213 w 112426"/>
+              <a:gd name="connsiteY3" fmla="*/ 0 h 112426"/>
+              <a:gd name="connsiteX4" fmla="*/ 112426 w 112426"/>
+              <a:gd name="connsiteY4" fmla="*/ 56213 h 112426"/>
+            </a:gdLst>
+            <a:ahLst/>
+            <a:cxnLst>
+              <a:cxn ang="0">
+                <a:pos x="connsiteX0" y="connsiteY0"/>
+              </a:cxn>
+              <a:cxn ang="0">
+                <a:pos x="connsiteX1" y="connsiteY1"/>
+              </a:cxn>
+              <a:cxn ang="0">
+                <a:pos x="connsiteX2" y="connsiteY2"/>
+              </a:cxn>
+              <a:cxn ang="0">
+                <a:pos x="connsiteX3" y="connsiteY3"/>
+              </a:cxn>
+              <a:cxn ang="0">
+                <a:pos x="connsiteX4" y="connsiteY4"/>
+              </a:cxn>
+            </a:cxnLst>
+            <a:rect l="l" t="t" r="r" b="b"/>
+            <a:pathLst>
+              <a:path w="112426" h="112426">
+                <a:moveTo>
+                  <a:pt x="112426" y="56213"/>
+                </a:moveTo>
+                <a:cubicBezTo>
+                  <a:pt x="112426" y="87259"/>
+                  <a:pt x="87259" y="112426"/>
+                  <a:pt x="56213" y="112426"/>
+                </a:cubicBezTo>
+                <a:cubicBezTo>
+                  <a:pt x="25167" y="112426"/>
+                  <a:pt x="0" y="87259"/>
+                  <a:pt x="0" y="56213"/>
+                </a:cubicBezTo>
+                <a:cubicBezTo>
+                  <a:pt x="0" y="25167"/>
+                  <a:pt x="25167" y="0"/>
+                  <a:pt x="56213" y="0"/>
+                </a:cubicBezTo>
+                <a:cubicBezTo>
+                  <a:pt x="87259" y="0"/>
+                  <a:pt x="112426" y="25167"/>
+                  <a:pt x="112426" y="56213"/>
+                </a:cubicBezTo>
+                <a:close/>
+              </a:path>
+            </a:pathLst>
+          </a:custGeom>
+          <a:solidFill>
+            <a:schemeClr val="accent2"/>
+          </a:solidFill>
+          <a:ln w="516" cap="flat">
+            <a:noFill/>
+            <a:prstDash val="solid"/>
+            <a:miter/>
+          </a:ln>
+        </p:spPr>
+        <p:txBody>
+          <a:bodyPr rtlCol="0" anchor="ctr"/>
+          <a:lstStyle/>
+          <a:p>
+            <a:endParaRPr lang="en-US"/>
+          </a:p>
+        </p:txBody>
+      </p:sp>
+      <p:cxnSp>
+        <p:nvCxnSpPr>
+          <p:cNvPr id="69" name="Straight Connector 68">
+            <a:extLst>
+              <a:ext uri="{FF2B5EF4-FFF2-40B4-BE49-F238E27FC236}">
+                <a16:creationId xmlns:a16="http://schemas.microsoft.com/office/drawing/2014/main" id="{C49DA8F6-BCC1-4447-B54C-57856834B94B}"/>
+              </a:ext>
+              <a:ext uri="{C183D7F6-B498-43B3-948B-1728B52AA6E4}">
+                <adec:decorative xmlns:adec="http://schemas.microsoft.com/office/drawing/2017/decorative" val="1"/>
+              </a:ext>
+            </a:extLst>
+          </p:cNvPr>
+          <p:cNvCxnSpPr>
+            <a:cxnSpLocks noGrp="1" noRot="1" noChangeAspect="1" noMove="1" noResize="1" noEditPoints="1" noAdjustHandles="1" noChangeArrowheads="1" noChangeShapeType="1"/>
+          </p:cNvCxnSpPr>
+          <p:nvPr>
+            <p:extLst>
+              <p:ext uri="{386F3935-93C4-4BCD-93E2-E3B085C9AB24}">
+                <p16:designElem xmlns:p16="http://schemas.microsoft.com/office/powerpoint/2015/main" val="1"/>
+              </p:ext>
+            </p:extLst>
+          </p:nvPr>
+        </p:nvCxnSpPr>
+        <p:spPr>
+          <a:xfrm>
+            <a:off x="11586162" y="3610394"/>
+            <a:ext cx="0" cy="3238728"/>
+          </a:xfrm>
+          <a:prstGeom prst="line">
+            <a:avLst/>
+          </a:prstGeom>
+          <a:ln w="25400" cap="sq">
+            <a:gradFill flip="none" rotWithShape="1">
+              <a:gsLst>
+                <a:gs pos="0">
+                  <a:schemeClr val="accent2"/>
+                </a:gs>
+                <a:gs pos="100000">
+                  <a:schemeClr val="accent4"/>
+                </a:gs>
+              </a:gsLst>
+              <a:lin ang="16200000" scaled="1"/>
+              <a:tileRect/>
+            </a:gradFill>
+            <a:bevel/>
+          </a:ln>
+        </p:spPr>
+        <p:style>
+          <a:lnRef idx="1">
+            <a:schemeClr val="accent1"/>
+          </a:lnRef>
+          <a:fillRef idx="0">
+            <a:schemeClr val="accent1"/>
+          </a:fillRef>
+          <a:effectRef idx="0">
+            <a:schemeClr val="accent1"/>
+          </a:effectRef>
+          <a:fontRef idx="minor">
+            <a:schemeClr val="tx1"/>
+          </a:fontRef>
+        </p:style>
+      </p:cxnSp>
+    </p:spTree>
+    <p:extLst>
+      <p:ext uri="{BB962C8B-B14F-4D97-AF65-F5344CB8AC3E}">
+        <p14:creationId xmlns:p14="http://schemas.microsoft.com/office/powerpoint/2010/main" val="162693427"/>
       </p:ext>
     </p:extLst>
   </p:cSld>

</xml_diff>